<commit_message>
Updated Collections PPT and assignment in progress
</commit_message>
<xml_diff>
--- a/Day6/Collections.pptx
+++ b/Day6/Collections.pptx
@@ -20,11 +20,18 @@
     <p:sldId id="269" r:id="rId14"/>
     <p:sldId id="267" r:id="rId15"/>
     <p:sldId id="273" r:id="rId16"/>
-    <p:sldId id="274" r:id="rId17"/>
-    <p:sldId id="275" r:id="rId18"/>
-    <p:sldId id="276" r:id="rId19"/>
-    <p:sldId id="277" r:id="rId20"/>
-    <p:sldId id="278" r:id="rId21"/>
+    <p:sldId id="276" r:id="rId17"/>
+    <p:sldId id="279" r:id="rId18"/>
+    <p:sldId id="277" r:id="rId19"/>
+    <p:sldId id="278" r:id="rId20"/>
+    <p:sldId id="280" r:id="rId21"/>
+    <p:sldId id="281" r:id="rId22"/>
+    <p:sldId id="282" r:id="rId23"/>
+    <p:sldId id="283" r:id="rId24"/>
+    <p:sldId id="284" r:id="rId25"/>
+    <p:sldId id="286" r:id="rId26"/>
+    <p:sldId id="287" r:id="rId27"/>
+    <p:sldId id="285" r:id="rId28"/>
   </p:sldIdLst>
   <p:sldSz cx="9144000" cy="6858000" type="screen4x3"/>
   <p:notesSz cx="6858000" cy="9144000"/>
@@ -3963,25 +3970,6 @@
           </a:p>
         </p:txBody>
       </p:sp>
-      <p:sp>
-        <p:nvSpPr>
-          <p:cNvPr id="4" name="Subtitle 3"/>
-          <p:cNvSpPr>
-            <a:spLocks noGrp="1"/>
-          </p:cNvSpPr>
-          <p:nvPr>
-            <p:ph type="subTitle" idx="1"/>
-          </p:nvPr>
-        </p:nvSpPr>
-        <p:spPr/>
-        <p:txBody>
-          <a:bodyPr/>
-          <a:lstStyle/>
-          <a:p>
-            <a:endParaRPr lang="en-US"/>
-          </a:p>
-        </p:txBody>
-      </p:sp>
     </p:spTree>
     <p:extLst>
       <p:ext uri="{BB962C8B-B14F-4D97-AF65-F5344CB8AC3E}">
@@ -3992,6 +3980,13 @@
   <p:clrMapOvr>
     <a:masterClrMapping/>
   </p:clrMapOvr>
+  <p:timing>
+    <p:tnLst>
+      <p:par>
+        <p:cTn xmlns:p14="http://schemas.microsoft.com/office/powerpoint/2010/main" id="1" dur="indefinite" restart="never" nodeType="tmRoot"/>
+      </p:par>
+    </p:tnLst>
+  </p:timing>
 </p:sld>
 </file>
 
@@ -4014,29 +4009,6 @@
       </p:grpSpPr>
       <p:sp>
         <p:nvSpPr>
-          <p:cNvPr id="2" name="Title 1"/>
-          <p:cNvSpPr>
-            <a:spLocks noGrp="1"/>
-          </p:cNvSpPr>
-          <p:nvPr>
-            <p:ph type="title"/>
-          </p:nvPr>
-        </p:nvSpPr>
-        <p:spPr/>
-        <p:txBody>
-          <a:bodyPr/>
-          <a:lstStyle/>
-          <a:p>
-            <a:r>
-              <a:rPr lang="en-US" dirty="0" err="1"/>
-              <a:t>IEqualityComparer</a:t>
-            </a:r>
-            <a:endParaRPr lang="en-US" dirty="0"/>
-          </a:p>
-        </p:txBody>
-      </p:sp>
-      <p:sp>
-        <p:nvSpPr>
           <p:cNvPr id="3" name="Content Placeholder 2"/>
           <p:cNvSpPr>
             <a:spLocks noGrp="1"/>
@@ -4045,172 +4017,104 @@
             <p:ph idx="1"/>
           </p:nvPr>
         </p:nvSpPr>
-        <p:spPr/>
+        <p:spPr>
+          <a:xfrm>
+            <a:off x="457200" y="804790"/>
+            <a:ext cx="8229600" cy="5321374"/>
+          </a:xfrm>
+        </p:spPr>
         <p:txBody>
           <a:bodyPr>
-            <a:normAutofit fontScale="85000" lnSpcReduction="10000"/>
+            <a:normAutofit/>
           </a:bodyPr>
           <a:lstStyle/>
           <a:p>
-            <a:pPr marL="0" indent="0">
-              <a:buNone/>
-            </a:pPr>
-            <a:r>
-              <a:rPr lang="en-US" dirty="0"/>
-              <a:t>public interface </a:t>
-            </a:r>
-            <a:r>
-              <a:rPr lang="en-US" dirty="0" err="1"/>
-              <a:t>IEqualityComparer</a:t>
-            </a:r>
-            <a:r>
-              <a:rPr lang="en-US" dirty="0"/>
-              <a:t>&lt;T&gt;</a:t>
-            </a:r>
-          </a:p>
-          <a:p>
-            <a:pPr marL="0" indent="0">
-              <a:buNone/>
-            </a:pPr>
-            <a:r>
-              <a:rPr lang="en-US" dirty="0"/>
-              <a:t>{</a:t>
-            </a:r>
-          </a:p>
-          <a:p>
-            <a:pPr marL="400050" lvl="1" indent="0">
-              <a:buNone/>
-            </a:pPr>
-            <a:r>
-              <a:rPr lang="en-US" dirty="0" err="1"/>
-              <a:t>bool</a:t>
-            </a:r>
-            <a:r>
-              <a:rPr lang="en-US" dirty="0"/>
-              <a:t> Equals (T x, T y);</a:t>
-            </a:r>
-          </a:p>
-          <a:p>
-            <a:pPr marL="400050" lvl="1" indent="0">
-              <a:buNone/>
-            </a:pPr>
-            <a:r>
-              <a:rPr lang="en-US" dirty="0" err="1"/>
-              <a:t>int</a:t>
-            </a:r>
-            <a:r>
-              <a:rPr lang="en-US" dirty="0"/>
-              <a:t> </a:t>
-            </a:r>
-            <a:r>
-              <a:rPr lang="en-US" dirty="0" err="1"/>
-              <a:t>GetHashCode</a:t>
-            </a:r>
-            <a:r>
-              <a:rPr lang="en-US" dirty="0"/>
-              <a:t> (T </a:t>
-            </a:r>
-            <a:r>
-              <a:rPr lang="en-US" dirty="0" err="1"/>
-              <a:t>obj</a:t>
-            </a:r>
-            <a:r>
-              <a:rPr lang="en-US" dirty="0"/>
-              <a:t>);</a:t>
-            </a:r>
-          </a:p>
-          <a:p>
-            <a:pPr marL="0" indent="0">
-              <a:buNone/>
-            </a:pPr>
-            <a:r>
-              <a:rPr lang="en-US" dirty="0"/>
-              <a:t>}</a:t>
-            </a:r>
-          </a:p>
-          <a:p>
-            <a:pPr marL="0" indent="0">
-              <a:buNone/>
-            </a:pPr>
-            <a:r>
-              <a:rPr lang="en-US" dirty="0"/>
-              <a:t>public interface </a:t>
-            </a:r>
-            <a:r>
-              <a:rPr lang="en-US" dirty="0" err="1"/>
-              <a:t>IEqualityComparer</a:t>
-            </a:r>
-            <a:r>
-              <a:rPr lang="en-US" dirty="0"/>
-              <a:t> // </a:t>
-            </a:r>
-            <a:r>
-              <a:rPr lang="en-US" dirty="0" err="1"/>
-              <a:t>Nongeneric</a:t>
-            </a:r>
-            <a:r>
-              <a:rPr lang="en-US" dirty="0"/>
-              <a:t> version</a:t>
-            </a:r>
-          </a:p>
-          <a:p>
-            <a:pPr marL="0" indent="0">
-              <a:buNone/>
-            </a:pPr>
-            <a:r>
-              <a:rPr lang="en-US" dirty="0"/>
-              <a:t>{</a:t>
-            </a:r>
-          </a:p>
-          <a:p>
-            <a:pPr marL="400050" lvl="1" indent="0">
-              <a:buNone/>
-            </a:pPr>
-            <a:r>
-              <a:rPr lang="en-US" dirty="0" err="1"/>
-              <a:t>bool</a:t>
-            </a:r>
-            <a:r>
-              <a:rPr lang="en-US" dirty="0"/>
-              <a:t> Equals (object x, object y);</a:t>
-            </a:r>
-          </a:p>
-          <a:p>
-            <a:pPr marL="400050" lvl="1" indent="0">
-              <a:buNone/>
-            </a:pPr>
-            <a:r>
-              <a:rPr lang="en-US" dirty="0" err="1"/>
-              <a:t>int</a:t>
-            </a:r>
-            <a:r>
-              <a:rPr lang="en-US" dirty="0"/>
-              <a:t> </a:t>
-            </a:r>
-            <a:r>
-              <a:rPr lang="en-US" dirty="0" err="1"/>
-              <a:t>GetHashCode</a:t>
-            </a:r>
-            <a:r>
-              <a:rPr lang="en-US" dirty="0"/>
-              <a:t> (object </a:t>
-            </a:r>
-            <a:r>
-              <a:rPr lang="en-US" dirty="0" err="1"/>
-              <a:t>obj</a:t>
-            </a:r>
-            <a:r>
-              <a:rPr lang="en-US" dirty="0"/>
-              <a:t>);</a:t>
-            </a:r>
-          </a:p>
-          <a:p>
-            <a:pPr marL="0" indent="0">
-              <a:buNone/>
-            </a:pPr>
-            <a:r>
-              <a:rPr lang="en-US" dirty="0"/>
-              <a:t>}</a:t>
+            <a:r>
+              <a:rPr lang="en-US" dirty="0" err="1"/>
+              <a:t>IEnumerable</a:t>
+            </a:r>
+            <a:r>
+              <a:rPr lang="en-US" dirty="0"/>
+              <a:t>&lt;T&gt; (and </a:t>
+            </a:r>
+            <a:r>
+              <a:rPr lang="en-US" dirty="0" err="1"/>
+              <a:t>IEnumerable</a:t>
+            </a:r>
+            <a:r>
+              <a:rPr lang="en-US" dirty="0"/>
+              <a:t>)</a:t>
+            </a:r>
+          </a:p>
+          <a:p>
+            <a:pPr marL="800100" lvl="2" indent="0">
+              <a:buNone/>
+            </a:pPr>
+            <a:r>
+              <a:rPr lang="en-US" dirty="0"/>
+              <a:t>Provides minimum functionality (enumeration only)</a:t>
+            </a:r>
+          </a:p>
+          <a:p>
+            <a:r>
+              <a:rPr lang="en-US" dirty="0" err="1"/>
+              <a:t>ICollection</a:t>
+            </a:r>
+            <a:r>
+              <a:rPr lang="en-US" dirty="0"/>
+              <a:t>&lt;T&gt; (and </a:t>
+            </a:r>
+            <a:r>
+              <a:rPr lang="en-US" dirty="0" err="1"/>
+              <a:t>ICollection</a:t>
+            </a:r>
+            <a:r>
+              <a:rPr lang="en-US" dirty="0"/>
+              <a:t>)</a:t>
+            </a:r>
+          </a:p>
+          <a:p>
+            <a:pPr marL="800100" lvl="2" indent="0">
+              <a:buNone/>
+            </a:pPr>
+            <a:r>
+              <a:rPr lang="en-US" dirty="0"/>
+              <a:t>Provides medium functionality (e.g., the Count property)</a:t>
+            </a:r>
+          </a:p>
+          <a:p>
+            <a:r>
+              <a:rPr lang="en-US" dirty="0" err="1"/>
+              <a:t>IList</a:t>
+            </a:r>
+            <a:r>
+              <a:rPr lang="en-US" dirty="0"/>
+              <a:t> &lt;T&gt;/</a:t>
+            </a:r>
+            <a:r>
+              <a:rPr lang="en-US" dirty="0" err="1"/>
+              <a:t>IDictionary</a:t>
+            </a:r>
+            <a:r>
+              <a:rPr lang="en-US" dirty="0"/>
+              <a:t> &lt;K,V&gt; and their </a:t>
+            </a:r>
+            <a:r>
+              <a:rPr lang="en-US" dirty="0" err="1"/>
+              <a:t>nongeneric</a:t>
+            </a:r>
+            <a:r>
+              <a:rPr lang="en-US" dirty="0"/>
+              <a:t> versions</a:t>
+            </a:r>
+          </a:p>
+          <a:p>
+            <a:pPr marL="800100" lvl="2" indent="0">
+              <a:buNone/>
+            </a:pPr>
+            <a:r>
+              <a:rPr lang="en-US" dirty="0"/>
+              <a:t>Provide maximum functionality (including “random” access by index/key)</a:t>
             </a:r>
           </a:p>
         </p:txBody>
@@ -4218,7 +4122,7 @@
     </p:spTree>
     <p:extLst>
       <p:ext uri="{BB962C8B-B14F-4D97-AF65-F5344CB8AC3E}">
-        <p14:creationId xmlns:p14="http://schemas.microsoft.com/office/powerpoint/2010/main" val="3030978917"/>
+        <p14:creationId xmlns:p14="http://schemas.microsoft.com/office/powerpoint/2010/main" val="2152716074"/>
       </p:ext>
     </p:extLst>
   </p:cSld>
@@ -4262,141 +4166,63 @@
             <p:ph type="title"/>
           </p:nvPr>
         </p:nvSpPr>
-        <p:spPr/>
+        <p:spPr>
+          <a:xfrm>
+            <a:off x="457200" y="274638"/>
+            <a:ext cx="8229600" cy="793679"/>
+          </a:xfrm>
+        </p:spPr>
         <p:txBody>
           <a:bodyPr/>
           <a:lstStyle/>
           <a:p>
             <a:r>
-              <a:rPr lang="en-US" dirty="0"/>
-              <a:t>IComparer and Comparer</a:t>
-            </a:r>
-          </a:p>
-        </p:txBody>
-      </p:sp>
-      <p:sp>
-        <p:nvSpPr>
-          <p:cNvPr id="3" name="Content Placeholder 2"/>
-          <p:cNvSpPr>
-            <a:spLocks noGrp="1"/>
-          </p:cNvSpPr>
-          <p:nvPr>
-            <p:ph idx="1"/>
-          </p:nvPr>
-        </p:nvSpPr>
-        <p:spPr/>
-        <p:txBody>
-          <a:bodyPr>
-            <a:normAutofit lnSpcReduction="10000"/>
-          </a:bodyPr>
-          <a:lstStyle/>
-          <a:p>
-            <a:pPr marL="0" indent="0">
-              <a:buNone/>
-            </a:pPr>
-            <a:r>
-              <a:rPr lang="en-US" dirty="0"/>
-              <a:t>public interface IComparer</a:t>
-            </a:r>
-          </a:p>
-          <a:p>
-            <a:pPr marL="0" indent="0">
-              <a:buNone/>
-            </a:pPr>
-            <a:r>
-              <a:rPr lang="en-US" dirty="0"/>
-              <a:t>{</a:t>
-            </a:r>
-          </a:p>
-          <a:p>
-            <a:pPr marL="400050" lvl="1" indent="0">
-              <a:buNone/>
-            </a:pPr>
-            <a:r>
-              <a:rPr lang="en-US" dirty="0" err="1"/>
-              <a:t>int</a:t>
-            </a:r>
-            <a:r>
-              <a:rPr lang="en-US" dirty="0"/>
-              <a:t> Compare(object x, object y)</a:t>
-            </a:r>
-            <a:r>
               <a:rPr lang="en-US" dirty="0" smtClean="0"/>
-              <a:t>; //</a:t>
+              <a:t>Array Clone</a:t>
             </a:r>
             <a:endParaRPr lang="en-US" dirty="0"/>
           </a:p>
-          <a:p>
-            <a:pPr marL="0" indent="0">
-              <a:buNone/>
-            </a:pPr>
-            <a:r>
-              <a:rPr lang="en-US" dirty="0"/>
-              <a:t>}</a:t>
-            </a:r>
-          </a:p>
-          <a:p>
-            <a:pPr marL="0" indent="0">
-              <a:buNone/>
-            </a:pPr>
-            <a:r>
-              <a:rPr lang="en-US" dirty="0"/>
-              <a:t>public interface IComparer &lt;in T&gt;</a:t>
-            </a:r>
-          </a:p>
-          <a:p>
-            <a:pPr marL="0" indent="0">
-              <a:buNone/>
-            </a:pPr>
-            <a:r>
-              <a:rPr lang="en-US" dirty="0"/>
-              <a:t>{</a:t>
-            </a:r>
-          </a:p>
-          <a:p>
-            <a:pPr marL="400050" lvl="1" indent="0">
-              <a:buNone/>
-            </a:pPr>
-            <a:r>
-              <a:rPr lang="en-US" dirty="0" err="1"/>
-              <a:t>int</a:t>
-            </a:r>
-            <a:r>
-              <a:rPr lang="en-US" dirty="0"/>
-              <a:t> Compare(T x, T y)</a:t>
-            </a:r>
-            <a:r>
-              <a:rPr lang="en-US" dirty="0" smtClean="0"/>
-              <a:t>;   </a:t>
-            </a:r>
-            <a:endParaRPr lang="en-US" dirty="0"/>
-          </a:p>
-          <a:p>
-            <a:pPr marL="0" indent="0">
-              <a:buNone/>
-            </a:pPr>
-            <a:r>
-              <a:rPr lang="en-US" dirty="0"/>
-              <a:t>}</a:t>
-            </a:r>
-          </a:p>
-        </p:txBody>
-      </p:sp>
-      <p:sp>
-        <p:nvSpPr>
-          <p:cNvPr id="4" name="Rectangle 3"/>
-          <p:cNvSpPr/>
+        </p:txBody>
+      </p:sp>
+      <p:pic>
+        <p:nvPicPr>
+          <p:cNvPr id="5" name="Picture 4"/>
+          <p:cNvPicPr>
+            <a:picLocks noChangeAspect="1"/>
+          </p:cNvPicPr>
           <p:nvPr/>
-        </p:nvSpPr>
+        </p:nvPicPr>
+        <p:blipFill>
+          <a:blip r:embed="rId2"/>
+          <a:stretch>
+            <a:fillRect/>
+          </a:stretch>
+        </p:blipFill>
         <p:spPr>
           <a:xfrm>
-            <a:off x="6088575" y="4688612"/>
-            <a:ext cx="2938796" cy="646331"/>
+            <a:off x="2560244" y="1445182"/>
+            <a:ext cx="3225687" cy="2870783"/>
           </a:xfrm>
           <a:prstGeom prst="rect">
             <a:avLst/>
           </a:prstGeom>
         </p:spPr>
+      </p:pic>
+      <p:sp>
+        <p:nvSpPr>
+          <p:cNvPr id="6" name="Rectangle 5"/>
+          <p:cNvSpPr/>
+          <p:nvPr/>
+        </p:nvSpPr>
+        <p:spPr>
+          <a:xfrm>
+            <a:off x="1843303" y="4890305"/>
+            <a:ext cx="6283811" cy="646331"/>
+          </a:xfrm>
+          <a:prstGeom prst="rect">
+            <a:avLst/>
+          </a:prstGeom>
+        </p:spPr>
         <p:txBody>
           <a:bodyPr wrap="square">
             <a:spAutoFit/>
@@ -4404,29 +4230,22 @@
           <a:lstStyle/>
           <a:p>
             <a:r>
-              <a:rPr lang="en-US" sz="1200" dirty="0" smtClean="0"/>
-              <a:t>Less than zero 	- x is less than y.</a:t>
-            </a:r>
-          </a:p>
-          <a:p>
-            <a:r>
-              <a:rPr lang="en-US" sz="1200" dirty="0" smtClean="0"/>
-              <a:t>Zero 			- x equals y.</a:t>
-            </a:r>
-          </a:p>
-          <a:p>
-            <a:r>
-              <a:rPr lang="en-US" sz="1200" dirty="0" smtClean="0"/>
-              <a:t>Greater than zero	- x is greater than y.</a:t>
-            </a:r>
-            <a:endParaRPr lang="en-US" sz="1200" dirty="0"/>
+              <a:rPr lang="en-US" dirty="0"/>
+              <a:t>StringBuilder[] builders2 = builders;</a:t>
+            </a:r>
+          </a:p>
+          <a:p>
+            <a:r>
+              <a:rPr lang="en-US" dirty="0"/>
+              <a:t>StringBuilder[] shallowClone = (StringBuilder[]) builders.Clone();</a:t>
+            </a:r>
           </a:p>
         </p:txBody>
       </p:sp>
     </p:spTree>
     <p:extLst>
       <p:ext uri="{BB962C8B-B14F-4D97-AF65-F5344CB8AC3E}">
-        <p14:creationId xmlns:p14="http://schemas.microsoft.com/office/powerpoint/2010/main" val="4264378129"/>
+        <p14:creationId xmlns:p14="http://schemas.microsoft.com/office/powerpoint/2010/main" val="3361350709"/>
       </p:ext>
     </p:extLst>
   </p:cSld>
@@ -4462,6 +4281,37 @@
       </p:grpSpPr>
       <p:sp>
         <p:nvSpPr>
+          <p:cNvPr id="2" name="Title 1"/>
+          <p:cNvSpPr>
+            <a:spLocks noGrp="1"/>
+          </p:cNvSpPr>
+          <p:nvPr>
+            <p:ph type="title"/>
+          </p:nvPr>
+        </p:nvSpPr>
+        <p:spPr/>
+        <p:txBody>
+          <a:bodyPr/>
+          <a:lstStyle/>
+          <a:p>
+            <a:r>
+              <a:rPr lang="en-US" dirty="0" err="1"/>
+              <a:t>ICollection</a:t>
+            </a:r>
+            <a:r>
+              <a:rPr lang="en-US" dirty="0"/>
+              <a:t>&lt;T&gt; and </a:t>
+            </a:r>
+            <a:r>
+              <a:rPr lang="en-US" dirty="0" err="1"/>
+              <a:t>ICollection</a:t>
+            </a:r>
+            <a:endParaRPr lang="en-US" dirty="0"/>
+          </a:p>
+        </p:txBody>
+      </p:sp>
+      <p:sp>
+        <p:nvSpPr>
           <p:cNvPr id="3" name="Content Placeholder 2"/>
           <p:cNvSpPr>
             <a:spLocks noGrp="1"/>
@@ -4470,104 +4320,297 @@
             <p:ph idx="1"/>
           </p:nvPr>
         </p:nvSpPr>
-        <p:spPr>
-          <a:xfrm>
-            <a:off x="457200" y="804790"/>
-            <a:ext cx="8229600" cy="5321374"/>
-          </a:xfrm>
-        </p:spPr>
+        <p:spPr/>
         <p:txBody>
           <a:bodyPr>
-            <a:normAutofit/>
+            <a:normAutofit fontScale="47500" lnSpcReduction="20000"/>
           </a:bodyPr>
           <a:lstStyle/>
           <a:p>
+            <a:pPr marL="0" indent="0">
+              <a:buNone/>
+            </a:pPr>
+            <a:r>
+              <a:rPr lang="en-US" dirty="0"/>
+              <a:t>public interface </a:t>
+            </a:r>
+            <a:r>
+              <a:rPr lang="en-US" dirty="0" err="1"/>
+              <a:t>ICollection</a:t>
+            </a:r>
+            <a:r>
+              <a:rPr lang="en-US" dirty="0"/>
+              <a:t>&lt;T&gt; : </a:t>
+            </a:r>
             <a:r>
               <a:rPr lang="en-US" dirty="0" err="1"/>
               <a:t>IEnumerable</a:t>
             </a:r>
             <a:r>
               <a:rPr lang="en-US" dirty="0"/>
-              <a:t>&lt;T&gt; (and </a:t>
+              <a:t>&lt;T&gt;, </a:t>
             </a:r>
             <a:r>
               <a:rPr lang="en-US" dirty="0" err="1"/>
               <a:t>IEnumerable</a:t>
             </a:r>
-            <a:r>
-              <a:rPr lang="en-US" dirty="0"/>
-              <a:t>)</a:t>
-            </a:r>
-          </a:p>
-          <a:p>
-            <a:pPr marL="800100" lvl="2" indent="0">
-              <a:buNone/>
-            </a:pPr>
-            <a:r>
-              <a:rPr lang="en-US" dirty="0"/>
-              <a:t>Provides minimum functionality (enumeration only)</a:t>
-            </a:r>
-          </a:p>
-          <a:p>
+            <a:endParaRPr lang="en-US" dirty="0"/>
+          </a:p>
+          <a:p>
+            <a:pPr marL="0" indent="0">
+              <a:buNone/>
+            </a:pPr>
+            <a:r>
+              <a:rPr lang="en-US" dirty="0"/>
+              <a:t>{</a:t>
+            </a:r>
+          </a:p>
+          <a:p>
+            <a:pPr marL="400050" lvl="1" indent="0">
+              <a:buNone/>
+            </a:pPr>
+            <a:r>
+              <a:rPr lang="en-US" dirty="0" err="1"/>
+              <a:t>int</a:t>
+            </a:r>
+            <a:r>
+              <a:rPr lang="en-US" dirty="0"/>
+              <a:t> Count { get; }</a:t>
+            </a:r>
+          </a:p>
+          <a:p>
+            <a:pPr marL="400050" lvl="1" indent="0">
+              <a:buNone/>
+            </a:pPr>
+            <a:r>
+              <a:rPr lang="en-US" dirty="0" err="1"/>
+              <a:t>bool</a:t>
+            </a:r>
+            <a:r>
+              <a:rPr lang="en-US" dirty="0"/>
+              <a:t> Contains (T item);</a:t>
+            </a:r>
+          </a:p>
+          <a:p>
+            <a:pPr marL="400050" lvl="1" indent="0">
+              <a:buNone/>
+            </a:pPr>
+            <a:r>
+              <a:rPr lang="en-US" dirty="0"/>
+              <a:t>void </a:t>
+            </a:r>
+            <a:r>
+              <a:rPr lang="en-US" dirty="0" err="1"/>
+              <a:t>CopyTo</a:t>
+            </a:r>
+            <a:r>
+              <a:rPr lang="en-US" dirty="0"/>
+              <a:t> (T[] array, </a:t>
+            </a:r>
+            <a:r>
+              <a:rPr lang="en-US" dirty="0" err="1"/>
+              <a:t>int</a:t>
+            </a:r>
+            <a:r>
+              <a:rPr lang="en-US" dirty="0"/>
+              <a:t> </a:t>
+            </a:r>
+            <a:r>
+              <a:rPr lang="en-US" dirty="0" err="1"/>
+              <a:t>arrayIndex</a:t>
+            </a:r>
+            <a:r>
+              <a:rPr lang="en-US" dirty="0"/>
+              <a:t>);</a:t>
+            </a:r>
+          </a:p>
+          <a:p>
+            <a:pPr marL="400050" lvl="1" indent="0">
+              <a:buNone/>
+            </a:pPr>
+            <a:r>
+              <a:rPr lang="en-US" dirty="0" err="1"/>
+              <a:t>bool</a:t>
+            </a:r>
+            <a:r>
+              <a:rPr lang="en-US" dirty="0"/>
+              <a:t> </a:t>
+            </a:r>
+            <a:r>
+              <a:rPr lang="en-US" dirty="0" err="1"/>
+              <a:t>IsReadOnly</a:t>
+            </a:r>
+            <a:r>
+              <a:rPr lang="en-US" dirty="0"/>
+              <a:t> { get; }</a:t>
+            </a:r>
+          </a:p>
+          <a:p>
+            <a:pPr marL="400050" lvl="1" indent="0">
+              <a:buNone/>
+            </a:pPr>
+            <a:r>
+              <a:rPr lang="en-US" dirty="0"/>
+              <a:t>void Add(T item);</a:t>
+            </a:r>
+          </a:p>
+          <a:p>
+            <a:pPr marL="400050" lvl="1" indent="0">
+              <a:buNone/>
+            </a:pPr>
+            <a:r>
+              <a:rPr lang="en-US" dirty="0" err="1"/>
+              <a:t>bool</a:t>
+            </a:r>
+            <a:r>
+              <a:rPr lang="en-US" dirty="0"/>
+              <a:t> Remove (T item);</a:t>
+            </a:r>
+          </a:p>
+          <a:p>
+            <a:pPr marL="400050" lvl="1" indent="0">
+              <a:buNone/>
+            </a:pPr>
+            <a:r>
+              <a:rPr lang="en-US" dirty="0"/>
+              <a:t>void Clear();</a:t>
+            </a:r>
+          </a:p>
+          <a:p>
+            <a:pPr marL="0" indent="0">
+              <a:buNone/>
+            </a:pPr>
+            <a:r>
+              <a:rPr lang="en-US" dirty="0" smtClean="0"/>
+              <a:t>}</a:t>
+            </a:r>
+          </a:p>
+          <a:p>
+            <a:pPr marL="0" indent="0">
+              <a:buNone/>
+            </a:pPr>
+            <a:endParaRPr lang="en-US" dirty="0"/>
+          </a:p>
+          <a:p>
+            <a:pPr marL="0" indent="0">
+              <a:buNone/>
+            </a:pPr>
+            <a:endParaRPr lang="en-US" dirty="0" smtClean="0"/>
+          </a:p>
+          <a:p>
+            <a:pPr marL="0" indent="0">
+              <a:buNone/>
+            </a:pPr>
+            <a:r>
+              <a:rPr lang="en-US" dirty="0"/>
+              <a:t>public interface </a:t>
+            </a:r>
             <a:r>
               <a:rPr lang="en-US" dirty="0" err="1"/>
               <a:t>ICollection</a:t>
             </a:r>
             <a:r>
               <a:rPr lang="en-US" dirty="0"/>
-              <a:t>&lt;T&gt; (and </a:t>
-            </a:r>
-            <a:r>
-              <a:rPr lang="en-US" dirty="0" err="1"/>
-              <a:t>ICollection</a:t>
-            </a:r>
-            <a:r>
-              <a:rPr lang="en-US" dirty="0"/>
-              <a:t>)</a:t>
-            </a:r>
-          </a:p>
-          <a:p>
-            <a:pPr marL="800100" lvl="2" indent="0">
-              <a:buNone/>
-            </a:pPr>
-            <a:r>
-              <a:rPr lang="en-US" dirty="0"/>
-              <a:t>Provides medium functionality (e.g., the Count property)</a:t>
-            </a:r>
-          </a:p>
-          <a:p>
-            <a:r>
-              <a:rPr lang="en-US" dirty="0" err="1"/>
-              <a:t>IList</a:t>
-            </a:r>
-            <a:r>
-              <a:rPr lang="en-US" dirty="0"/>
-              <a:t> &lt;T&gt;/</a:t>
-            </a:r>
-            <a:r>
-              <a:rPr lang="en-US" dirty="0" err="1"/>
-              <a:t>IDictionary</a:t>
-            </a:r>
-            <a:r>
-              <a:rPr lang="en-US" dirty="0"/>
-              <a:t> &lt;K,V&gt; and their </a:t>
-            </a:r>
-            <a:r>
-              <a:rPr lang="en-US" dirty="0" err="1"/>
-              <a:t>nongeneric</a:t>
-            </a:r>
-            <a:r>
-              <a:rPr lang="en-US" dirty="0"/>
-              <a:t> versions</a:t>
-            </a:r>
-          </a:p>
-          <a:p>
-            <a:pPr marL="800100" lvl="2" indent="0">
-              <a:buNone/>
-            </a:pPr>
-            <a:r>
-              <a:rPr lang="en-US" dirty="0"/>
-              <a:t>Provide maximum functionality (including “random” access by index/key)</a:t>
+              <a:t> : </a:t>
+            </a:r>
+            <a:r>
+              <a:rPr lang="en-US" dirty="0" err="1"/>
+              <a:t>IEnumerable</a:t>
+            </a:r>
+            <a:endParaRPr lang="en-US" dirty="0"/>
+          </a:p>
+          <a:p>
+            <a:pPr marL="0" indent="0">
+              <a:buNone/>
+            </a:pPr>
+            <a:r>
+              <a:rPr lang="en-US" dirty="0"/>
+              <a:t>{</a:t>
+            </a:r>
+          </a:p>
+          <a:p>
+            <a:pPr marL="400050" lvl="1" indent="0">
+              <a:buNone/>
+            </a:pPr>
+            <a:r>
+              <a:rPr lang="en-US" dirty="0" err="1"/>
+              <a:t>int</a:t>
+            </a:r>
+            <a:r>
+              <a:rPr lang="en-US" dirty="0"/>
+              <a:t> Count { get; }</a:t>
+            </a:r>
+          </a:p>
+          <a:p>
+            <a:pPr marL="400050" lvl="1" indent="0">
+              <a:buNone/>
+            </a:pPr>
+            <a:r>
+              <a:rPr lang="en-US" dirty="0" err="1"/>
+              <a:t>bool</a:t>
+            </a:r>
+            <a:r>
+              <a:rPr lang="en-US" dirty="0"/>
+              <a:t> </a:t>
+            </a:r>
+            <a:r>
+              <a:rPr lang="en-US" dirty="0" err="1"/>
+              <a:t>IsSynchronized</a:t>
+            </a:r>
+            <a:r>
+              <a:rPr lang="en-US" dirty="0"/>
+              <a:t> { get; }</a:t>
+            </a:r>
+          </a:p>
+          <a:p>
+            <a:pPr marL="400050" lvl="1" indent="0">
+              <a:buNone/>
+            </a:pPr>
+            <a:r>
+              <a:rPr lang="en-US" dirty="0"/>
+              <a:t>object </a:t>
+            </a:r>
+            <a:r>
+              <a:rPr lang="en-US" dirty="0" err="1"/>
+              <a:t>SyncRoot</a:t>
+            </a:r>
+            <a:r>
+              <a:rPr lang="en-US" dirty="0"/>
+              <a:t> { get; }</a:t>
+            </a:r>
+          </a:p>
+          <a:p>
+            <a:pPr marL="400050" lvl="1" indent="0">
+              <a:buNone/>
+            </a:pPr>
+            <a:r>
+              <a:rPr lang="en-US" dirty="0"/>
+              <a:t>void </a:t>
+            </a:r>
+            <a:r>
+              <a:rPr lang="en-US" dirty="0" err="1"/>
+              <a:t>CopyTo</a:t>
+            </a:r>
+            <a:r>
+              <a:rPr lang="en-US" dirty="0"/>
+              <a:t> (Array array, </a:t>
+            </a:r>
+            <a:r>
+              <a:rPr lang="en-US" dirty="0" err="1"/>
+              <a:t>int</a:t>
+            </a:r>
+            <a:r>
+              <a:rPr lang="en-US" dirty="0"/>
+              <a:t> index);</a:t>
+            </a:r>
+          </a:p>
+          <a:p>
+            <a:pPr marL="0" indent="0">
+              <a:buNone/>
+            </a:pPr>
+            <a:r>
+              <a:rPr lang="en-US" dirty="0"/>
+              <a:t>}</a:t>
             </a:r>
           </a:p>
         </p:txBody>
@@ -4575,7 +4618,7 @@
     </p:spTree>
     <p:extLst>
       <p:ext uri="{BB962C8B-B14F-4D97-AF65-F5344CB8AC3E}">
-        <p14:creationId xmlns:p14="http://schemas.microsoft.com/office/powerpoint/2010/main" val="2152716074"/>
+        <p14:creationId xmlns:p14="http://schemas.microsoft.com/office/powerpoint/2010/main" val="3110526864"/>
       </p:ext>
     </p:extLst>
   </p:cSld>
@@ -4626,7 +4669,7 @@
           <a:p>
             <a:r>
               <a:rPr lang="en-US" dirty="0" err="1"/>
-              <a:t>ICollection</a:t>
+              <a:t>IList</a:t>
             </a:r>
             <a:r>
               <a:rPr lang="en-US" dirty="0"/>
@@ -4634,7 +4677,7 @@
             </a:r>
             <a:r>
               <a:rPr lang="en-US" dirty="0" err="1"/>
-              <a:t>ICollection</a:t>
+              <a:t>IList</a:t>
             </a:r>
             <a:endParaRPr lang="en-US" dirty="0"/>
           </a:p>
@@ -4666,11 +4709,19 @@
             </a:r>
             <a:r>
               <a:rPr lang="en-US" dirty="0" err="1"/>
+              <a:t>IList</a:t>
+            </a:r>
+            <a:r>
+              <a:rPr lang="en-US" dirty="0"/>
+              <a:t>&lt;T&gt; : </a:t>
+            </a:r>
+            <a:r>
+              <a:rPr lang="en-US" dirty="0" err="1"/>
               <a:t>ICollection</a:t>
             </a:r>
             <a:r>
               <a:rPr lang="en-US" dirty="0"/>
-              <a:t>&lt;T&gt; : </a:t>
+              <a:t>&lt;T&gt;, </a:t>
             </a:r>
             <a:r>
               <a:rPr lang="en-US" dirty="0" err="1"/>
@@ -4700,12 +4751,16 @@
               <a:buNone/>
             </a:pPr>
             <a:r>
+              <a:rPr lang="en-US" dirty="0"/>
+              <a:t>T this [</a:t>
+            </a:r>
+            <a:r>
               <a:rPr lang="en-US" dirty="0" err="1"/>
               <a:t>int</a:t>
             </a:r>
             <a:r>
               <a:rPr lang="en-US" dirty="0"/>
-              <a:t> Count { get; }</a:t>
+              <a:t> index] { get; set; }</a:t>
             </a:r>
           </a:p>
           <a:p>
@@ -4714,11 +4769,19 @@
             </a:pPr>
             <a:r>
               <a:rPr lang="en-US" dirty="0" err="1"/>
-              <a:t>bool</a:t>
-            </a:r>
-            <a:r>
-              <a:rPr lang="en-US" dirty="0"/>
-              <a:t> Contains (T item);</a:t>
+              <a:t>int</a:t>
+            </a:r>
+            <a:r>
+              <a:rPr lang="en-US" dirty="0"/>
+              <a:t> </a:t>
+            </a:r>
+            <a:r>
+              <a:rPr lang="en-US" dirty="0" err="1"/>
+              <a:t>IndexOf</a:t>
+            </a:r>
+            <a:r>
+              <a:rPr lang="en-US" dirty="0"/>
+              <a:t> (T item);</a:t>
             </a:r>
           </a:p>
           <a:p>
@@ -4727,15 +4790,32 @@
             </a:pPr>
             <a:r>
               <a:rPr lang="en-US" dirty="0"/>
+              <a:t>void Insert (</a:t>
+            </a:r>
+            <a:r>
+              <a:rPr lang="en-US" dirty="0" err="1"/>
+              <a:t>int</a:t>
+            </a:r>
+            <a:r>
+              <a:rPr lang="en-US" dirty="0"/>
+              <a:t> index, T item);</a:t>
+            </a:r>
+          </a:p>
+          <a:p>
+            <a:pPr marL="400050" lvl="1" indent="0">
+              <a:buNone/>
+            </a:pPr>
+            <a:r>
+              <a:rPr lang="en-US" dirty="0"/>
               <a:t>void </a:t>
             </a:r>
             <a:r>
               <a:rPr lang="en-US" dirty="0" err="1"/>
-              <a:t>CopyTo</a:t>
-            </a:r>
-            <a:r>
-              <a:rPr lang="en-US" dirty="0"/>
-              <a:t> (T[] array, </a:t>
+              <a:t>RemoveAt</a:t>
+            </a:r>
+            <a:r>
+              <a:rPr lang="en-US" dirty="0"/>
+              <a:t> (</a:t>
             </a:r>
             <a:r>
               <a:rPr lang="en-US" dirty="0" err="1"/>
@@ -4743,67 +4823,7 @@
             </a:r>
             <a:r>
               <a:rPr lang="en-US" dirty="0"/>
-              <a:t> </a:t>
-            </a:r>
-            <a:r>
-              <a:rPr lang="en-US" dirty="0" err="1"/>
-              <a:t>arrayIndex</a:t>
-            </a:r>
-            <a:r>
-              <a:rPr lang="en-US" dirty="0"/>
-              <a:t>);</a:t>
-            </a:r>
-          </a:p>
-          <a:p>
-            <a:pPr marL="400050" lvl="1" indent="0">
-              <a:buNone/>
-            </a:pPr>
-            <a:r>
-              <a:rPr lang="en-US" dirty="0" err="1"/>
-              <a:t>bool</a:t>
-            </a:r>
-            <a:r>
-              <a:rPr lang="en-US" dirty="0"/>
-              <a:t> </a:t>
-            </a:r>
-            <a:r>
-              <a:rPr lang="en-US" dirty="0" err="1"/>
-              <a:t>IsReadOnly</a:t>
-            </a:r>
-            <a:r>
-              <a:rPr lang="en-US" dirty="0"/>
-              <a:t> { get; }</a:t>
-            </a:r>
-          </a:p>
-          <a:p>
-            <a:pPr marL="400050" lvl="1" indent="0">
-              <a:buNone/>
-            </a:pPr>
-            <a:r>
-              <a:rPr lang="en-US" dirty="0"/>
-              <a:t>void Add(T item);</a:t>
-            </a:r>
-          </a:p>
-          <a:p>
-            <a:pPr marL="400050" lvl="1" indent="0">
-              <a:buNone/>
-            </a:pPr>
-            <a:r>
-              <a:rPr lang="en-US" dirty="0" err="1"/>
-              <a:t>bool</a:t>
-            </a:r>
-            <a:r>
-              <a:rPr lang="en-US" dirty="0"/>
-              <a:t> Remove (T item);</a:t>
-            </a:r>
-          </a:p>
-          <a:p>
-            <a:pPr marL="400050" lvl="1" indent="0">
-              <a:buNone/>
-            </a:pPr>
-            <a:r>
-              <a:rPr lang="en-US" dirty="0"/>
-              <a:t>void Clear();</a:t>
+              <a:t> index);</a:t>
             </a:r>
           </a:p>
           <a:p>
@@ -4819,40 +4839,42 @@
             <a:pPr marL="0" indent="0">
               <a:buNone/>
             </a:pPr>
+            <a:endParaRPr lang="en-US" dirty="0" smtClean="0"/>
+          </a:p>
+          <a:p>
+            <a:pPr marL="0" indent="0">
+              <a:buNone/>
+            </a:pPr>
+            <a:r>
+              <a:rPr lang="en-US" dirty="0"/>
+              <a:t>public interface </a:t>
+            </a:r>
+            <a:r>
+              <a:rPr lang="en-US" dirty="0" err="1"/>
+              <a:t>IList</a:t>
+            </a:r>
+            <a:r>
+              <a:rPr lang="en-US" dirty="0"/>
+              <a:t> : </a:t>
+            </a:r>
+            <a:r>
+              <a:rPr lang="en-US" dirty="0" err="1"/>
+              <a:t>ICollection</a:t>
+            </a:r>
+            <a:r>
+              <a:rPr lang="en-US" dirty="0"/>
+              <a:t>, </a:t>
+            </a:r>
+            <a:r>
+              <a:rPr lang="en-US" dirty="0" err="1"/>
+              <a:t>IEnumerable</a:t>
+            </a:r>
             <a:endParaRPr lang="en-US" dirty="0"/>
           </a:p>
           <a:p>
             <a:pPr marL="0" indent="0">
               <a:buNone/>
             </a:pPr>
-            <a:endParaRPr lang="en-US" dirty="0" smtClean="0"/>
-          </a:p>
-          <a:p>
-            <a:pPr marL="0" indent="0">
-              <a:buNone/>
-            </a:pPr>
-            <a:r>
-              <a:rPr lang="en-US" dirty="0"/>
-              <a:t>public interface </a:t>
-            </a:r>
-            <a:r>
-              <a:rPr lang="en-US" dirty="0" err="1"/>
-              <a:t>ICollection</a:t>
-            </a:r>
-            <a:r>
-              <a:rPr lang="en-US" dirty="0"/>
-              <a:t> : </a:t>
-            </a:r>
-            <a:r>
-              <a:rPr lang="en-US" dirty="0" err="1"/>
-              <a:t>IEnumerable</a:t>
-            </a:r>
-            <a:endParaRPr lang="en-US" dirty="0"/>
-          </a:p>
-          <a:p>
-            <a:pPr marL="0" indent="0">
-              <a:buNone/>
-            </a:pPr>
             <a:r>
               <a:rPr lang="en-US" dirty="0"/>
               <a:t>{</a:t>
@@ -4863,12 +4885,16 @@
               <a:buNone/>
             </a:pPr>
             <a:r>
+              <a:rPr lang="en-US" dirty="0"/>
+              <a:t>object this [</a:t>
+            </a:r>
+            <a:r>
               <a:rPr lang="en-US" dirty="0" err="1"/>
               <a:t>int</a:t>
             </a:r>
             <a:r>
               <a:rPr lang="en-US" dirty="0"/>
-              <a:t> Count { get; }</a:t>
+              <a:t> index] { get; set }</a:t>
             </a:r>
           </a:p>
           <a:p>
@@ -4885,7 +4911,7 @@
             </a:r>
             <a:r>
               <a:rPr lang="en-US" dirty="0" err="1"/>
-              <a:t>IsSynchronized</a:t>
+              <a:t>IsFixedSize</a:t>
             </a:r>
             <a:r>
               <a:rPr lang="en-US" dirty="0"/>
@@ -4897,12 +4923,16 @@
               <a:buNone/>
             </a:pPr>
             <a:r>
-              <a:rPr lang="en-US" dirty="0"/>
-              <a:t>object </a:t>
-            </a:r>
-            <a:r>
-              <a:rPr lang="en-US" dirty="0" err="1"/>
-              <a:t>SyncRoot</a:t>
+              <a:rPr lang="en-US" dirty="0" err="1"/>
+              <a:t>bool</a:t>
+            </a:r>
+            <a:r>
+              <a:rPr lang="en-US" dirty="0"/>
+              <a:t> </a:t>
+            </a:r>
+            <a:r>
+              <a:rPr lang="en-US" dirty="0" err="1"/>
+              <a:t>IsReadOnly</a:t>
             </a:r>
             <a:r>
               <a:rPr lang="en-US" dirty="0"/>
@@ -4914,16 +4944,98 @@
               <a:buNone/>
             </a:pPr>
             <a:r>
+              <a:rPr lang="en-US" dirty="0" err="1"/>
+              <a:t>int</a:t>
+            </a:r>
+            <a:r>
+              <a:rPr lang="en-US" dirty="0"/>
+              <a:t> Add (object value);</a:t>
+            </a:r>
+          </a:p>
+          <a:p>
+            <a:pPr marL="400050" lvl="1" indent="0">
+              <a:buNone/>
+            </a:pPr>
+            <a:r>
+              <a:rPr lang="en-US" dirty="0"/>
+              <a:t>void Clear();</a:t>
+            </a:r>
+          </a:p>
+          <a:p>
+            <a:pPr marL="400050" lvl="1" indent="0">
+              <a:buNone/>
+            </a:pPr>
+            <a:r>
+              <a:rPr lang="en-US" dirty="0" err="1"/>
+              <a:t>bool</a:t>
+            </a:r>
+            <a:r>
+              <a:rPr lang="en-US" dirty="0"/>
+              <a:t> Contains (object value);</a:t>
+            </a:r>
+          </a:p>
+          <a:p>
+            <a:pPr marL="400050" lvl="1" indent="0">
+              <a:buNone/>
+            </a:pPr>
+            <a:r>
+              <a:rPr lang="en-US" dirty="0" err="1"/>
+              <a:t>int</a:t>
+            </a:r>
+            <a:r>
+              <a:rPr lang="en-US" dirty="0"/>
+              <a:t> </a:t>
+            </a:r>
+            <a:r>
+              <a:rPr lang="en-US" dirty="0" err="1"/>
+              <a:t>IndexOf</a:t>
+            </a:r>
+            <a:r>
+              <a:rPr lang="en-US" dirty="0"/>
+              <a:t> (object value);</a:t>
+            </a:r>
+          </a:p>
+          <a:p>
+            <a:pPr marL="400050" lvl="1" indent="0">
+              <a:buNone/>
+            </a:pPr>
+            <a:r>
+              <a:rPr lang="en-US" dirty="0"/>
+              <a:t>void Insert (</a:t>
+            </a:r>
+            <a:r>
+              <a:rPr lang="en-US" dirty="0" err="1"/>
+              <a:t>int</a:t>
+            </a:r>
+            <a:r>
+              <a:rPr lang="en-US" dirty="0"/>
+              <a:t> index, object value);</a:t>
+            </a:r>
+          </a:p>
+          <a:p>
+            <a:pPr marL="400050" lvl="1" indent="0">
+              <a:buNone/>
+            </a:pPr>
+            <a:r>
+              <a:rPr lang="en-US" dirty="0"/>
+              <a:t>void Remove (object value);</a:t>
+            </a:r>
+          </a:p>
+          <a:p>
+            <a:pPr marL="400050" lvl="1" indent="0">
+              <a:buNone/>
+            </a:pPr>
+            <a:r>
               <a:rPr lang="en-US" dirty="0"/>
               <a:t>void </a:t>
             </a:r>
             <a:r>
               <a:rPr lang="en-US" dirty="0" err="1"/>
-              <a:t>CopyTo</a:t>
-            </a:r>
-            <a:r>
-              <a:rPr lang="en-US" dirty="0"/>
-              <a:t> (Array array, </a:t>
+              <a:t>RemoveAt</a:t>
+            </a:r>
+            <a:r>
+              <a:rPr lang="en-US" dirty="0"/>
+              <a:t> (</a:t>
             </a:r>
             <a:r>
               <a:rPr lang="en-US" dirty="0" err="1"/>
@@ -4948,7 +5060,7 @@
     </p:spTree>
     <p:extLst>
       <p:ext uri="{BB962C8B-B14F-4D97-AF65-F5344CB8AC3E}">
-        <p14:creationId xmlns:p14="http://schemas.microsoft.com/office/powerpoint/2010/main" val="3110526864"/>
+        <p14:creationId xmlns:p14="http://schemas.microsoft.com/office/powerpoint/2010/main" val="1117356005"/>
       </p:ext>
     </p:extLst>
   </p:cSld>
@@ -5304,18 +5416,9 @@
           <a:lstStyle/>
           <a:p>
             <a:r>
-              <a:rPr lang="en-US" dirty="0" err="1"/>
-              <a:t>IList</a:t>
-            </a:r>
-            <a:r>
-              <a:rPr lang="en-US" dirty="0"/>
-              <a:t>&lt;T&gt; and </a:t>
-            </a:r>
-            <a:r>
-              <a:rPr lang="en-US" dirty="0" err="1"/>
-              <a:t>IList</a:t>
-            </a:r>
-            <a:endParaRPr lang="en-US" dirty="0"/>
+              <a:rPr lang="en-US" dirty="0"/>
+              <a:t>Lists, Queues, Stacks, and Sets</a:t>
+            </a:r>
           </a:p>
         </p:txBody>
       </p:sp>
@@ -5331,378 +5434,1967 @@
         </p:nvSpPr>
         <p:spPr/>
         <p:txBody>
-          <a:bodyPr>
-            <a:normAutofit fontScale="47500" lnSpcReduction="20000"/>
-          </a:bodyPr>
+          <a:bodyPr/>
           <a:lstStyle/>
           <a:p>
-            <a:pPr marL="0" indent="0">
-              <a:buNone/>
-            </a:pPr>
-            <a:r>
-              <a:rPr lang="en-US" dirty="0"/>
-              <a:t>public interface </a:t>
-            </a:r>
-            <a:r>
-              <a:rPr lang="en-US" dirty="0" err="1"/>
-              <a:t>IList</a:t>
-            </a:r>
-            <a:r>
-              <a:rPr lang="en-US" dirty="0"/>
-              <a:t>&lt;T&gt; : </a:t>
-            </a:r>
-            <a:r>
-              <a:rPr lang="en-US" dirty="0" err="1"/>
-              <a:t>ICollection</a:t>
-            </a:r>
-            <a:r>
-              <a:rPr lang="en-US" dirty="0"/>
-              <a:t>&lt;T&gt;, </a:t>
-            </a:r>
-            <a:r>
-              <a:rPr lang="en-US" dirty="0" err="1"/>
-              <a:t>IEnumerable</a:t>
-            </a:r>
-            <a:r>
-              <a:rPr lang="en-US" dirty="0"/>
-              <a:t>&lt;T&gt;, </a:t>
-            </a:r>
-            <a:r>
-              <a:rPr lang="en-US" dirty="0" err="1"/>
-              <a:t>IEnumerable</a:t>
-            </a:r>
-            <a:endParaRPr lang="en-US" dirty="0"/>
-          </a:p>
-          <a:p>
-            <a:pPr marL="0" indent="0">
-              <a:buNone/>
-            </a:pPr>
-            <a:r>
-              <a:rPr lang="en-US" dirty="0"/>
-              <a:t>{</a:t>
-            </a:r>
-          </a:p>
-          <a:p>
-            <a:pPr marL="400050" lvl="1" indent="0">
-              <a:buNone/>
-            </a:pPr>
-            <a:r>
-              <a:rPr lang="en-US" dirty="0"/>
-              <a:t>T this [</a:t>
-            </a:r>
-            <a:r>
-              <a:rPr lang="en-US" dirty="0" err="1"/>
-              <a:t>int</a:t>
-            </a:r>
-            <a:r>
-              <a:rPr lang="en-US" dirty="0"/>
-              <a:t> index] { get; set; }</a:t>
-            </a:r>
-          </a:p>
-          <a:p>
-            <a:pPr marL="400050" lvl="1" indent="0">
-              <a:buNone/>
-            </a:pPr>
-            <a:r>
-              <a:rPr lang="en-US" dirty="0" err="1"/>
-              <a:t>int</a:t>
-            </a:r>
-            <a:r>
-              <a:rPr lang="en-US" dirty="0"/>
-              <a:t> </a:t>
-            </a:r>
-            <a:r>
-              <a:rPr lang="en-US" dirty="0" err="1"/>
-              <a:t>IndexOf</a:t>
-            </a:r>
-            <a:r>
-              <a:rPr lang="en-US" dirty="0"/>
-              <a:t> (T item);</a:t>
-            </a:r>
-          </a:p>
-          <a:p>
-            <a:pPr marL="400050" lvl="1" indent="0">
-              <a:buNone/>
-            </a:pPr>
-            <a:r>
-              <a:rPr lang="en-US" dirty="0"/>
-              <a:t>void Insert (</a:t>
-            </a:r>
-            <a:r>
-              <a:rPr lang="en-US" dirty="0" err="1"/>
-              <a:t>int</a:t>
-            </a:r>
-            <a:r>
-              <a:rPr lang="en-US" dirty="0"/>
-              <a:t> index, T item);</a:t>
-            </a:r>
-          </a:p>
-          <a:p>
-            <a:pPr marL="400050" lvl="1" indent="0">
-              <a:buNone/>
-            </a:pPr>
-            <a:r>
-              <a:rPr lang="en-US" dirty="0"/>
-              <a:t>void </a:t>
-            </a:r>
-            <a:r>
-              <a:rPr lang="en-US" dirty="0" err="1"/>
-              <a:t>RemoveAt</a:t>
-            </a:r>
-            <a:r>
-              <a:rPr lang="en-US" dirty="0"/>
-              <a:t> (</a:t>
-            </a:r>
-            <a:r>
-              <a:rPr lang="en-US" dirty="0" err="1"/>
-              <a:t>int</a:t>
-            </a:r>
-            <a:r>
-              <a:rPr lang="en-US" dirty="0"/>
-              <a:t> index);</a:t>
-            </a:r>
-          </a:p>
-          <a:p>
-            <a:pPr marL="0" indent="0">
-              <a:buNone/>
-            </a:pPr>
+            <a:r>
+              <a:rPr lang="en-US" dirty="0" err="1" smtClean="0"/>
+              <a:t>ArrayList</a:t>
+            </a:r>
+            <a:endParaRPr lang="en-US" dirty="0" smtClean="0"/>
+          </a:p>
+          <a:p>
+            <a:r>
+              <a:rPr lang="en-US" dirty="0"/>
+              <a:t>List&lt;T</a:t>
+            </a:r>
             <a:r>
               <a:rPr lang="en-US" dirty="0" smtClean="0"/>
-              <a:t>}</a:t>
-            </a:r>
-          </a:p>
-          <a:p>
-            <a:pPr marL="0" indent="0">
-              <a:buNone/>
-            </a:pPr>
-            <a:endParaRPr lang="en-US" dirty="0" smtClean="0"/>
-          </a:p>
-          <a:p>
-            <a:pPr marL="0" indent="0">
-              <a:buNone/>
-            </a:pPr>
-            <a:r>
-              <a:rPr lang="en-US" dirty="0"/>
-              <a:t>public interface </a:t>
-            </a:r>
-            <a:r>
-              <a:rPr lang="en-US" dirty="0" err="1"/>
-              <a:t>IList</a:t>
-            </a:r>
-            <a:r>
-              <a:rPr lang="en-US" dirty="0"/>
-              <a:t> : </a:t>
-            </a:r>
-            <a:r>
-              <a:rPr lang="en-US" dirty="0" err="1"/>
-              <a:t>ICollection</a:t>
-            </a:r>
-            <a:r>
-              <a:rPr lang="en-US" dirty="0"/>
-              <a:t>, </a:t>
-            </a:r>
-            <a:r>
-              <a:rPr lang="en-US" dirty="0" err="1"/>
-              <a:t>IEnumerable</a:t>
-            </a:r>
-            <a:endParaRPr lang="en-US" dirty="0"/>
-          </a:p>
-          <a:p>
-            <a:pPr marL="0" indent="0">
-              <a:buNone/>
-            </a:pPr>
-            <a:r>
-              <a:rPr lang="en-US" dirty="0"/>
-              <a:t>{</a:t>
-            </a:r>
-          </a:p>
-          <a:p>
-            <a:pPr marL="400050" lvl="1" indent="0">
-              <a:buNone/>
-            </a:pPr>
-            <a:r>
-              <a:rPr lang="en-US" dirty="0"/>
-              <a:t>object this [</a:t>
-            </a:r>
-            <a:r>
-              <a:rPr lang="en-US" dirty="0" err="1"/>
-              <a:t>int</a:t>
-            </a:r>
-            <a:r>
-              <a:rPr lang="en-US" dirty="0"/>
-              <a:t> index] { get; set }</a:t>
-            </a:r>
-          </a:p>
-          <a:p>
-            <a:pPr marL="400050" lvl="1" indent="0">
-              <a:buNone/>
-            </a:pPr>
-            <a:r>
-              <a:rPr lang="en-US" dirty="0" err="1"/>
-              <a:t>bool</a:t>
-            </a:r>
-            <a:r>
-              <a:rPr lang="en-US" dirty="0"/>
-              <a:t> </a:t>
-            </a:r>
-            <a:r>
-              <a:rPr lang="en-US" dirty="0" err="1"/>
-              <a:t>IsFixedSize</a:t>
-            </a:r>
-            <a:r>
-              <a:rPr lang="en-US" dirty="0"/>
-              <a:t> { get; }</a:t>
-            </a:r>
-          </a:p>
-          <a:p>
-            <a:pPr marL="400050" lvl="1" indent="0">
-              <a:buNone/>
-            </a:pPr>
-            <a:r>
-              <a:rPr lang="en-US" dirty="0" err="1"/>
-              <a:t>bool</a:t>
-            </a:r>
-            <a:r>
-              <a:rPr lang="en-US" dirty="0"/>
-              <a:t> </a:t>
-            </a:r>
-            <a:r>
-              <a:rPr lang="en-US" dirty="0" err="1"/>
-              <a:t>IsReadOnly</a:t>
-            </a:r>
-            <a:r>
-              <a:rPr lang="en-US" dirty="0"/>
-              <a:t> { get; }</a:t>
-            </a:r>
-          </a:p>
-          <a:p>
-            <a:pPr marL="400050" lvl="1" indent="0">
-              <a:buNone/>
-            </a:pPr>
-            <a:r>
-              <a:rPr lang="en-US" dirty="0" err="1"/>
-              <a:t>int</a:t>
-            </a:r>
-            <a:r>
-              <a:rPr lang="en-US" dirty="0"/>
-              <a:t> Add (object value);</a:t>
-            </a:r>
-          </a:p>
-          <a:p>
-            <a:pPr marL="400050" lvl="1" indent="0">
-              <a:buNone/>
-            </a:pPr>
-            <a:r>
-              <a:rPr lang="en-US" dirty="0"/>
-              <a:t>void Clear();</a:t>
-            </a:r>
-          </a:p>
-          <a:p>
-            <a:pPr marL="400050" lvl="1" indent="0">
-              <a:buNone/>
-            </a:pPr>
-            <a:r>
-              <a:rPr lang="en-US" dirty="0" err="1"/>
-              <a:t>bool</a:t>
-            </a:r>
-            <a:r>
-              <a:rPr lang="en-US" dirty="0"/>
-              <a:t> Contains (object value);</a:t>
-            </a:r>
-          </a:p>
-          <a:p>
-            <a:pPr marL="400050" lvl="1" indent="0">
-              <a:buNone/>
-            </a:pPr>
-            <a:r>
-              <a:rPr lang="en-US" dirty="0" err="1"/>
-              <a:t>int</a:t>
-            </a:r>
-            <a:r>
-              <a:rPr lang="en-US" dirty="0"/>
-              <a:t> </a:t>
-            </a:r>
-            <a:r>
-              <a:rPr lang="en-US" dirty="0" err="1"/>
-              <a:t>IndexOf</a:t>
-            </a:r>
-            <a:r>
-              <a:rPr lang="en-US" dirty="0"/>
-              <a:t> (object value);</a:t>
-            </a:r>
-          </a:p>
-          <a:p>
-            <a:pPr marL="400050" lvl="1" indent="0">
-              <a:buNone/>
-            </a:pPr>
-            <a:r>
-              <a:rPr lang="en-US" dirty="0"/>
-              <a:t>void Insert (</a:t>
-            </a:r>
-            <a:r>
-              <a:rPr lang="en-US" dirty="0" err="1"/>
-              <a:t>int</a:t>
-            </a:r>
-            <a:r>
-              <a:rPr lang="en-US" dirty="0"/>
-              <a:t> index, object value);</a:t>
-            </a:r>
-          </a:p>
-          <a:p>
-            <a:pPr marL="400050" lvl="1" indent="0">
-              <a:buNone/>
-            </a:pPr>
-            <a:r>
-              <a:rPr lang="en-US" dirty="0"/>
-              <a:t>void Remove (object value);</a:t>
-            </a:r>
-          </a:p>
-          <a:p>
-            <a:pPr marL="400050" lvl="1" indent="0">
-              <a:buNone/>
-            </a:pPr>
-            <a:r>
-              <a:rPr lang="en-US" dirty="0"/>
-              <a:t>void </a:t>
-            </a:r>
-            <a:r>
-              <a:rPr lang="en-US" dirty="0" err="1"/>
-              <a:t>RemoveAt</a:t>
-            </a:r>
-            <a:r>
-              <a:rPr lang="en-US" dirty="0"/>
-              <a:t> (</a:t>
-            </a:r>
-            <a:r>
-              <a:rPr lang="en-US" dirty="0" err="1"/>
-              <a:t>int</a:t>
-            </a:r>
-            <a:r>
-              <a:rPr lang="en-US" dirty="0"/>
-              <a:t> index);</a:t>
-            </a:r>
-          </a:p>
-          <a:p>
-            <a:pPr marL="0" indent="0">
-              <a:buNone/>
-            </a:pPr>
-            <a:r>
-              <a:rPr lang="en-US" dirty="0"/>
-              <a:t>}</a:t>
-            </a:r>
-          </a:p>
-        </p:txBody>
-      </p:sp>
+              <a:t>&gt;</a:t>
+            </a:r>
+          </a:p>
+          <a:p>
+            <a:r>
+              <a:rPr lang="en-US" dirty="0" err="1"/>
+              <a:t>LinkedList</a:t>
+            </a:r>
+            <a:r>
+              <a:rPr lang="en-US" dirty="0"/>
+              <a:t>&lt;T</a:t>
+            </a:r>
+            <a:r>
+              <a:rPr lang="en-US" dirty="0" smtClean="0"/>
+              <a:t>&gt; - </a:t>
+            </a:r>
+            <a:r>
+              <a:rPr lang="en-US" dirty="0"/>
+              <a:t>generic doubly linked list</a:t>
+            </a:r>
+          </a:p>
+        </p:txBody>
+      </p:sp>
+      <p:pic>
+        <p:nvPicPr>
+          <p:cNvPr id="4" name="Picture 3"/>
+          <p:cNvPicPr>
+            <a:picLocks noChangeAspect="1"/>
+          </p:cNvPicPr>
+          <p:nvPr/>
+        </p:nvPicPr>
+        <p:blipFill>
+          <a:blip r:embed="rId2"/>
+          <a:stretch>
+            <a:fillRect/>
+          </a:stretch>
+        </p:blipFill>
+        <p:spPr>
+          <a:xfrm>
+            <a:off x="2051398" y="3596666"/>
+            <a:ext cx="4120765" cy="2279076"/>
+          </a:xfrm>
+          <a:prstGeom prst="rect">
+            <a:avLst/>
+          </a:prstGeom>
+        </p:spPr>
+      </p:pic>
     </p:spTree>
     <p:extLst>
       <p:ext uri="{BB962C8B-B14F-4D97-AF65-F5344CB8AC3E}">
-        <p14:creationId xmlns:p14="http://schemas.microsoft.com/office/powerpoint/2010/main" val="1117356005"/>
+        <p14:creationId xmlns:p14="http://schemas.microsoft.com/office/powerpoint/2010/main" val="207683717"/>
       </p:ext>
     </p:extLst>
   </p:cSld>
   <p:clrMapOvr>
     <a:masterClrMapping/>
   </p:clrMapOvr>
+  <p:timing>
+    <p:tnLst>
+      <p:par>
+        <p:cTn xmlns:p14="http://schemas.microsoft.com/office/powerpoint/2010/main" id="1" dur="indefinite" restart="never" nodeType="tmRoot"/>
+      </p:par>
+    </p:tnLst>
+  </p:timing>
+</p:sld>
+</file>
+
+<file path=ppt/slides/slide21.xml><?xml version="1.0" encoding="utf-8"?>
+<p:sld xmlns:a="http://schemas.openxmlformats.org/drawingml/2006/main" xmlns:r="http://schemas.openxmlformats.org/officeDocument/2006/relationships" xmlns:p="http://schemas.openxmlformats.org/presentationml/2006/main">
+  <p:cSld>
+    <p:spTree>
+      <p:nvGrpSpPr>
+        <p:cNvPr id="1" name=""/>
+        <p:cNvGrpSpPr/>
+        <p:nvPr/>
+      </p:nvGrpSpPr>
+      <p:grpSpPr>
+        <a:xfrm>
+          <a:off x="0" y="0"/>
+          <a:ext cx="0" cy="0"/>
+          <a:chOff x="0" y="0"/>
+          <a:chExt cx="0" cy="0"/>
+        </a:xfrm>
+      </p:grpSpPr>
+      <p:sp>
+        <p:nvSpPr>
+          <p:cNvPr id="3" name="Content Placeholder 2"/>
+          <p:cNvSpPr>
+            <a:spLocks noGrp="1"/>
+          </p:cNvSpPr>
+          <p:nvPr>
+            <p:ph idx="1"/>
+          </p:nvPr>
+        </p:nvSpPr>
+        <p:spPr>
+          <a:xfrm>
+            <a:off x="457200" y="415458"/>
+            <a:ext cx="8229600" cy="5710706"/>
+          </a:xfrm>
+        </p:spPr>
+        <p:txBody>
+          <a:bodyPr>
+            <a:normAutofit fontScale="47500" lnSpcReduction="20000"/>
+          </a:bodyPr>
+          <a:lstStyle/>
+          <a:p>
+            <a:r>
+              <a:rPr lang="en-US" dirty="0"/>
+              <a:t>Queue&lt;T&gt; and </a:t>
+            </a:r>
+            <a:r>
+              <a:rPr lang="en-US" dirty="0" smtClean="0"/>
+              <a:t>Queue - </a:t>
+            </a:r>
+            <a:r>
+              <a:rPr lang="en-US" dirty="0"/>
+              <a:t>first-in first-out (FIFO) data </a:t>
+            </a:r>
+            <a:r>
+              <a:rPr lang="en-US" dirty="0" smtClean="0"/>
+              <a:t>structures</a:t>
+            </a:r>
+          </a:p>
+          <a:p>
+            <a:pPr marL="1257300" lvl="3" indent="0">
+              <a:buNone/>
+            </a:pPr>
+            <a:r>
+              <a:rPr lang="en-US" dirty="0"/>
+              <a:t>public class Queue&lt;T&gt; : </a:t>
+            </a:r>
+            <a:r>
+              <a:rPr lang="en-US" dirty="0" err="1"/>
+              <a:t>IEnumerable</a:t>
+            </a:r>
+            <a:r>
+              <a:rPr lang="en-US" dirty="0"/>
+              <a:t>&lt;T&gt;, </a:t>
+            </a:r>
+            <a:r>
+              <a:rPr lang="en-US" dirty="0" err="1"/>
+              <a:t>ICollection</a:t>
+            </a:r>
+            <a:r>
+              <a:rPr lang="en-US" dirty="0"/>
+              <a:t>, </a:t>
+            </a:r>
+            <a:r>
+              <a:rPr lang="en-US" dirty="0" err="1"/>
+              <a:t>IEnumerable</a:t>
+            </a:r>
+            <a:endParaRPr lang="en-US" dirty="0"/>
+          </a:p>
+          <a:p>
+            <a:pPr marL="1257300" lvl="3" indent="0">
+              <a:buNone/>
+            </a:pPr>
+            <a:r>
+              <a:rPr lang="en-US" dirty="0"/>
+              <a:t>{</a:t>
+            </a:r>
+          </a:p>
+          <a:p>
+            <a:pPr marL="1714500" lvl="4" indent="0">
+              <a:buNone/>
+            </a:pPr>
+            <a:r>
+              <a:rPr lang="en-US" dirty="0"/>
+              <a:t>public Queue();</a:t>
+            </a:r>
+          </a:p>
+          <a:p>
+            <a:pPr marL="1714500" lvl="4" indent="0">
+              <a:buNone/>
+            </a:pPr>
+            <a:r>
+              <a:rPr lang="en-US" dirty="0"/>
+              <a:t>public Queue (</a:t>
+            </a:r>
+            <a:r>
+              <a:rPr lang="en-US" dirty="0" err="1"/>
+              <a:t>IEnumerable</a:t>
+            </a:r>
+            <a:r>
+              <a:rPr lang="en-US" dirty="0"/>
+              <a:t>&lt;T&gt; collection); // Copies existing elements</a:t>
+            </a:r>
+          </a:p>
+          <a:p>
+            <a:pPr marL="1714500" lvl="4" indent="0">
+              <a:buNone/>
+            </a:pPr>
+            <a:r>
+              <a:rPr lang="en-US" dirty="0"/>
+              <a:t>public Queue (</a:t>
+            </a:r>
+            <a:r>
+              <a:rPr lang="en-US" dirty="0" err="1"/>
+              <a:t>int</a:t>
+            </a:r>
+            <a:r>
+              <a:rPr lang="en-US" dirty="0"/>
+              <a:t> capacity); // To lessen auto-resizing</a:t>
+            </a:r>
+          </a:p>
+          <a:p>
+            <a:pPr marL="1714500" lvl="4" indent="0">
+              <a:buNone/>
+            </a:pPr>
+            <a:r>
+              <a:rPr lang="en-US" dirty="0"/>
+              <a:t>public void Clear();</a:t>
+            </a:r>
+          </a:p>
+          <a:p>
+            <a:pPr marL="1714500" lvl="4" indent="0">
+              <a:buNone/>
+            </a:pPr>
+            <a:r>
+              <a:rPr lang="en-US" dirty="0"/>
+              <a:t>public </a:t>
+            </a:r>
+            <a:r>
+              <a:rPr lang="en-US" dirty="0" err="1"/>
+              <a:t>bool</a:t>
+            </a:r>
+            <a:r>
+              <a:rPr lang="en-US" dirty="0"/>
+              <a:t> Contains (T item);</a:t>
+            </a:r>
+          </a:p>
+          <a:p>
+            <a:pPr marL="1714500" lvl="4" indent="0">
+              <a:buNone/>
+            </a:pPr>
+            <a:r>
+              <a:rPr lang="en-US" dirty="0"/>
+              <a:t>public void </a:t>
+            </a:r>
+            <a:r>
+              <a:rPr lang="en-US" dirty="0" err="1"/>
+              <a:t>CopyTo</a:t>
+            </a:r>
+            <a:r>
+              <a:rPr lang="en-US" dirty="0"/>
+              <a:t> (T[] array, </a:t>
+            </a:r>
+            <a:r>
+              <a:rPr lang="en-US" dirty="0" err="1"/>
+              <a:t>int</a:t>
+            </a:r>
+            <a:r>
+              <a:rPr lang="en-US" dirty="0"/>
+              <a:t> </a:t>
+            </a:r>
+            <a:r>
+              <a:rPr lang="en-US" dirty="0" err="1"/>
+              <a:t>arrayIndex</a:t>
+            </a:r>
+            <a:r>
+              <a:rPr lang="en-US" dirty="0"/>
+              <a:t>);</a:t>
+            </a:r>
+          </a:p>
+          <a:p>
+            <a:pPr marL="1714500" lvl="4" indent="0">
+              <a:buNone/>
+            </a:pPr>
+            <a:r>
+              <a:rPr lang="en-US" dirty="0"/>
+              <a:t>public </a:t>
+            </a:r>
+            <a:r>
+              <a:rPr lang="en-US" dirty="0" err="1"/>
+              <a:t>int</a:t>
+            </a:r>
+            <a:r>
+              <a:rPr lang="en-US" dirty="0"/>
+              <a:t> Count { get; }</a:t>
+            </a:r>
+          </a:p>
+          <a:p>
+            <a:pPr marL="1714500" lvl="4" indent="0">
+              <a:buNone/>
+            </a:pPr>
+            <a:r>
+              <a:rPr lang="en-US" dirty="0"/>
+              <a:t>public T </a:t>
+            </a:r>
+            <a:r>
+              <a:rPr lang="en-US" dirty="0" err="1"/>
+              <a:t>Dequeue</a:t>
+            </a:r>
+            <a:r>
+              <a:rPr lang="en-US" dirty="0"/>
+              <a:t>();</a:t>
+            </a:r>
+          </a:p>
+          <a:p>
+            <a:pPr marL="1714500" lvl="4" indent="0">
+              <a:buNone/>
+            </a:pPr>
+            <a:r>
+              <a:rPr lang="en-US" dirty="0"/>
+              <a:t>public void </a:t>
+            </a:r>
+            <a:r>
+              <a:rPr lang="en-US" dirty="0" err="1"/>
+              <a:t>Enqueue</a:t>
+            </a:r>
+            <a:r>
+              <a:rPr lang="en-US" dirty="0"/>
+              <a:t> (T item);</a:t>
+            </a:r>
+          </a:p>
+          <a:p>
+            <a:pPr marL="1714500" lvl="4" indent="0">
+              <a:buNone/>
+            </a:pPr>
+            <a:r>
+              <a:rPr lang="en-US" dirty="0"/>
+              <a:t>public Enumerator&lt;T&gt; </a:t>
+            </a:r>
+            <a:r>
+              <a:rPr lang="en-US" dirty="0" err="1"/>
+              <a:t>GetEnumerator</a:t>
+            </a:r>
+            <a:r>
+              <a:rPr lang="en-US" dirty="0"/>
+              <a:t>(); // To support foreach</a:t>
+            </a:r>
+          </a:p>
+          <a:p>
+            <a:pPr marL="1714500" lvl="4" indent="0">
+              <a:buNone/>
+            </a:pPr>
+            <a:r>
+              <a:rPr lang="en-US" dirty="0"/>
+              <a:t>public T Peek();</a:t>
+            </a:r>
+          </a:p>
+          <a:p>
+            <a:pPr marL="1714500" lvl="4" indent="0">
+              <a:buNone/>
+            </a:pPr>
+            <a:r>
+              <a:rPr lang="en-US" dirty="0"/>
+              <a:t>public T[] </a:t>
+            </a:r>
+            <a:r>
+              <a:rPr lang="en-US" dirty="0" err="1"/>
+              <a:t>ToArray</a:t>
+            </a:r>
+            <a:r>
+              <a:rPr lang="en-US" dirty="0"/>
+              <a:t>();</a:t>
+            </a:r>
+          </a:p>
+          <a:p>
+            <a:pPr marL="1714500" lvl="4" indent="0">
+              <a:buNone/>
+            </a:pPr>
+            <a:r>
+              <a:rPr lang="en-US" dirty="0"/>
+              <a:t>public void </a:t>
+            </a:r>
+            <a:r>
+              <a:rPr lang="en-US" dirty="0" err="1"/>
+              <a:t>TrimExcess</a:t>
+            </a:r>
+            <a:r>
+              <a:rPr lang="en-US" dirty="0"/>
+              <a:t>();</a:t>
+            </a:r>
+          </a:p>
+          <a:p>
+            <a:pPr marL="1257300" lvl="3" indent="0">
+              <a:buNone/>
+            </a:pPr>
+            <a:r>
+              <a:rPr lang="en-US" dirty="0"/>
+              <a:t>}</a:t>
+            </a:r>
+          </a:p>
+          <a:p>
+            <a:pPr marL="285750"/>
+            <a:endParaRPr lang="en-US" sz="3000" dirty="0" smtClean="0"/>
+          </a:p>
+          <a:p>
+            <a:r>
+              <a:rPr lang="en-US" sz="3000" dirty="0" smtClean="0"/>
+              <a:t>Stack</a:t>
+            </a:r>
+            <a:r>
+              <a:rPr lang="en-US" sz="3000" dirty="0"/>
+              <a:t>&lt;T&gt; and </a:t>
+            </a:r>
+            <a:r>
+              <a:rPr lang="en-US" sz="3000" dirty="0" smtClean="0"/>
+              <a:t>Stack</a:t>
+            </a:r>
+          </a:p>
+          <a:p>
+            <a:pPr marL="1257300" lvl="3" indent="0">
+              <a:buNone/>
+            </a:pPr>
+            <a:r>
+              <a:rPr lang="en-US" dirty="0"/>
+              <a:t>public class Stack&lt;T&gt; : </a:t>
+            </a:r>
+            <a:r>
+              <a:rPr lang="en-US" dirty="0" err="1"/>
+              <a:t>IEnumerable</a:t>
+            </a:r>
+            <a:r>
+              <a:rPr lang="en-US" dirty="0"/>
+              <a:t>&lt;T&gt;, </a:t>
+            </a:r>
+            <a:r>
+              <a:rPr lang="en-US" dirty="0" err="1"/>
+              <a:t>ICollection</a:t>
+            </a:r>
+            <a:r>
+              <a:rPr lang="en-US" dirty="0"/>
+              <a:t>, </a:t>
+            </a:r>
+            <a:r>
+              <a:rPr lang="en-US" dirty="0" err="1"/>
+              <a:t>IEnumerable</a:t>
+            </a:r>
+            <a:endParaRPr lang="en-US" dirty="0"/>
+          </a:p>
+          <a:p>
+            <a:pPr marL="1257300" lvl="3" indent="0">
+              <a:buNone/>
+            </a:pPr>
+            <a:r>
+              <a:rPr lang="en-US" dirty="0"/>
+              <a:t>{</a:t>
+            </a:r>
+          </a:p>
+          <a:p>
+            <a:pPr marL="1714500" lvl="4" indent="0">
+              <a:buNone/>
+            </a:pPr>
+            <a:r>
+              <a:rPr lang="en-US" dirty="0"/>
+              <a:t>public Stack();</a:t>
+            </a:r>
+          </a:p>
+          <a:p>
+            <a:pPr marL="1714500" lvl="4" indent="0">
+              <a:buNone/>
+            </a:pPr>
+            <a:r>
+              <a:rPr lang="en-US" dirty="0"/>
+              <a:t>public Stack (</a:t>
+            </a:r>
+            <a:r>
+              <a:rPr lang="en-US" dirty="0" err="1"/>
+              <a:t>IEnumerable</a:t>
+            </a:r>
+            <a:r>
+              <a:rPr lang="en-US" dirty="0"/>
+              <a:t>&lt;T&gt; collection); // Copies existing elements</a:t>
+            </a:r>
+          </a:p>
+          <a:p>
+            <a:pPr marL="1714500" lvl="4" indent="0">
+              <a:buNone/>
+            </a:pPr>
+            <a:r>
+              <a:rPr lang="en-US" dirty="0"/>
+              <a:t>public Stack (</a:t>
+            </a:r>
+            <a:r>
+              <a:rPr lang="en-US" dirty="0" err="1"/>
+              <a:t>int</a:t>
+            </a:r>
+            <a:r>
+              <a:rPr lang="en-US" dirty="0"/>
+              <a:t> capacity); // Lessens auto-resizing</a:t>
+            </a:r>
+          </a:p>
+          <a:p>
+            <a:pPr marL="1714500" lvl="4" indent="0">
+              <a:buNone/>
+            </a:pPr>
+            <a:r>
+              <a:rPr lang="en-US" dirty="0"/>
+              <a:t>public void Clear();</a:t>
+            </a:r>
+          </a:p>
+          <a:p>
+            <a:pPr marL="1714500" lvl="4" indent="0">
+              <a:buNone/>
+            </a:pPr>
+            <a:r>
+              <a:rPr lang="en-US" dirty="0"/>
+              <a:t>public </a:t>
+            </a:r>
+            <a:r>
+              <a:rPr lang="en-US" dirty="0" err="1"/>
+              <a:t>bool</a:t>
+            </a:r>
+            <a:r>
+              <a:rPr lang="en-US" dirty="0"/>
+              <a:t> Contains (T item);</a:t>
+            </a:r>
+          </a:p>
+          <a:p>
+            <a:pPr marL="1714500" lvl="4" indent="0">
+              <a:buNone/>
+            </a:pPr>
+            <a:r>
+              <a:rPr lang="en-US" dirty="0"/>
+              <a:t>public void </a:t>
+            </a:r>
+            <a:r>
+              <a:rPr lang="en-US" dirty="0" err="1"/>
+              <a:t>CopyTo</a:t>
+            </a:r>
+            <a:r>
+              <a:rPr lang="en-US" dirty="0"/>
+              <a:t> (T[] array, </a:t>
+            </a:r>
+            <a:r>
+              <a:rPr lang="en-US" dirty="0" err="1"/>
+              <a:t>int</a:t>
+            </a:r>
+            <a:r>
+              <a:rPr lang="en-US" dirty="0"/>
+              <a:t> </a:t>
+            </a:r>
+            <a:r>
+              <a:rPr lang="en-US" dirty="0" err="1"/>
+              <a:t>arrayIndex</a:t>
+            </a:r>
+            <a:r>
+              <a:rPr lang="en-US" dirty="0"/>
+              <a:t>);</a:t>
+            </a:r>
+          </a:p>
+          <a:p>
+            <a:pPr marL="1714500" lvl="4" indent="0">
+              <a:buNone/>
+            </a:pPr>
+            <a:r>
+              <a:rPr lang="en-US" dirty="0"/>
+              <a:t>public </a:t>
+            </a:r>
+            <a:r>
+              <a:rPr lang="en-US" dirty="0" err="1"/>
+              <a:t>int</a:t>
+            </a:r>
+            <a:r>
+              <a:rPr lang="en-US" dirty="0"/>
+              <a:t> Count { get; }</a:t>
+            </a:r>
+          </a:p>
+          <a:p>
+            <a:pPr marL="1714500" lvl="4" indent="0">
+              <a:buNone/>
+            </a:pPr>
+            <a:r>
+              <a:rPr lang="en-US" dirty="0"/>
+              <a:t>public Enumerator&lt;T&gt; </a:t>
+            </a:r>
+            <a:r>
+              <a:rPr lang="en-US" dirty="0" err="1"/>
+              <a:t>GetEnumerator</a:t>
+            </a:r>
+            <a:r>
+              <a:rPr lang="en-US" dirty="0"/>
+              <a:t>(); // To support foreach</a:t>
+            </a:r>
+          </a:p>
+          <a:p>
+            <a:pPr marL="1714500" lvl="4" indent="0">
+              <a:buNone/>
+            </a:pPr>
+            <a:r>
+              <a:rPr lang="en-US" sz="2100" dirty="0"/>
+              <a:t>public T Peek(); public T Pop();</a:t>
+            </a:r>
+          </a:p>
+          <a:p>
+            <a:pPr marL="1714500" lvl="4" indent="0">
+              <a:buNone/>
+            </a:pPr>
+            <a:r>
+              <a:rPr lang="en-US" sz="2100" dirty="0"/>
+              <a:t>public void Push (T item);</a:t>
+            </a:r>
+          </a:p>
+          <a:p>
+            <a:pPr marL="1714500" lvl="4" indent="0">
+              <a:buNone/>
+            </a:pPr>
+            <a:r>
+              <a:rPr lang="en-US" sz="2100" dirty="0"/>
+              <a:t>public T[] </a:t>
+            </a:r>
+            <a:r>
+              <a:rPr lang="en-US" sz="2100" dirty="0" err="1"/>
+              <a:t>ToArray</a:t>
+            </a:r>
+            <a:r>
+              <a:rPr lang="en-US" sz="2100" dirty="0"/>
+              <a:t>();</a:t>
+            </a:r>
+          </a:p>
+          <a:p>
+            <a:pPr marL="1714500" lvl="4" indent="0">
+              <a:buNone/>
+            </a:pPr>
+            <a:r>
+              <a:rPr lang="en-US" sz="2100" dirty="0"/>
+              <a:t>public void </a:t>
+            </a:r>
+            <a:r>
+              <a:rPr lang="en-US" sz="2100" dirty="0" err="1"/>
+              <a:t>TrimExcess</a:t>
+            </a:r>
+            <a:r>
+              <a:rPr lang="en-US" sz="2100" dirty="0"/>
+              <a:t>()</a:t>
+            </a:r>
+            <a:r>
+              <a:rPr lang="en-US" sz="2100" dirty="0" smtClean="0"/>
+              <a:t>;</a:t>
+            </a:r>
+          </a:p>
+          <a:p>
+            <a:pPr marL="1257300" lvl="3" indent="0">
+              <a:buNone/>
+            </a:pPr>
+            <a:r>
+              <a:rPr lang="en-US" sz="2100" dirty="0"/>
+              <a:t>}</a:t>
+            </a:r>
+          </a:p>
+        </p:txBody>
+      </p:sp>
+    </p:spTree>
+    <p:extLst>
+      <p:ext uri="{BB962C8B-B14F-4D97-AF65-F5344CB8AC3E}">
+        <p14:creationId xmlns:p14="http://schemas.microsoft.com/office/powerpoint/2010/main" val="2529745957"/>
+      </p:ext>
+    </p:extLst>
+  </p:cSld>
+  <p:clrMapOvr>
+    <a:masterClrMapping/>
+  </p:clrMapOvr>
+  <p:timing>
+    <p:tnLst>
+      <p:par>
+        <p:cTn xmlns:p14="http://schemas.microsoft.com/office/powerpoint/2010/main" id="1" dur="indefinite" restart="never" nodeType="tmRoot"/>
+      </p:par>
+    </p:tnLst>
+  </p:timing>
+</p:sld>
+</file>
+
+<file path=ppt/slides/slide22.xml><?xml version="1.0" encoding="utf-8"?>
+<p:sld xmlns:a="http://schemas.openxmlformats.org/drawingml/2006/main" xmlns:r="http://schemas.openxmlformats.org/officeDocument/2006/relationships" xmlns:p="http://schemas.openxmlformats.org/presentationml/2006/main">
+  <p:cSld>
+    <p:spTree>
+      <p:nvGrpSpPr>
+        <p:cNvPr id="1" name=""/>
+        <p:cNvGrpSpPr/>
+        <p:nvPr/>
+      </p:nvGrpSpPr>
+      <p:grpSpPr>
+        <a:xfrm>
+          <a:off x="0" y="0"/>
+          <a:ext cx="0" cy="0"/>
+          <a:chOff x="0" y="0"/>
+          <a:chExt cx="0" cy="0"/>
+        </a:xfrm>
+      </p:grpSpPr>
+      <p:sp>
+        <p:nvSpPr>
+          <p:cNvPr id="2" name="Title 1"/>
+          <p:cNvSpPr>
+            <a:spLocks noGrp="1"/>
+          </p:cNvSpPr>
+          <p:nvPr>
+            <p:ph type="title"/>
+          </p:nvPr>
+        </p:nvSpPr>
+        <p:spPr/>
+        <p:txBody>
+          <a:bodyPr/>
+          <a:lstStyle/>
+          <a:p>
+            <a:r>
+              <a:rPr lang="en-US" dirty="0"/>
+              <a:t>Dictionaries</a:t>
+            </a:r>
+          </a:p>
+        </p:txBody>
+      </p:sp>
+      <p:sp>
+        <p:nvSpPr>
+          <p:cNvPr id="3" name="Content Placeholder 2"/>
+          <p:cNvSpPr>
+            <a:spLocks noGrp="1"/>
+          </p:cNvSpPr>
+          <p:nvPr>
+            <p:ph idx="1"/>
+          </p:nvPr>
+        </p:nvSpPr>
+        <p:spPr/>
+        <p:txBody>
+          <a:bodyPr>
+            <a:normAutofit fontScale="85000" lnSpcReduction="20000"/>
+          </a:bodyPr>
+          <a:lstStyle/>
+          <a:p>
+            <a:r>
+              <a:rPr lang="en-US" dirty="0"/>
+              <a:t>A dictionary is a collection in which each element is a key/value pair. </a:t>
+            </a:r>
+            <a:endParaRPr lang="en-US" dirty="0" smtClean="0"/>
+          </a:p>
+          <a:p>
+            <a:endParaRPr lang="en-US" dirty="0" smtClean="0"/>
+          </a:p>
+          <a:p>
+            <a:pPr marL="800100" lvl="2" indent="0">
+              <a:buNone/>
+            </a:pPr>
+            <a:r>
+              <a:rPr lang="en-US" dirty="0"/>
+              <a:t>public interface </a:t>
+            </a:r>
+            <a:r>
+              <a:rPr lang="en-US" dirty="0" err="1"/>
+              <a:t>IDictionary</a:t>
+            </a:r>
+            <a:r>
+              <a:rPr lang="en-US" dirty="0"/>
+              <a:t> &lt;</a:t>
+            </a:r>
+            <a:r>
+              <a:rPr lang="en-US" dirty="0" err="1"/>
+              <a:t>TKey</a:t>
+            </a:r>
+            <a:r>
+              <a:rPr lang="en-US" dirty="0"/>
+              <a:t>, </a:t>
+            </a:r>
+            <a:r>
+              <a:rPr lang="en-US" dirty="0" err="1"/>
+              <a:t>TValue</a:t>
+            </a:r>
+            <a:r>
+              <a:rPr lang="en-US" dirty="0"/>
+              <a:t>&gt; :</a:t>
+            </a:r>
+          </a:p>
+          <a:p>
+            <a:pPr marL="800100" lvl="2" indent="0">
+              <a:buNone/>
+            </a:pPr>
+            <a:r>
+              <a:rPr lang="en-US" dirty="0" err="1"/>
+              <a:t>ICollection</a:t>
+            </a:r>
+            <a:r>
+              <a:rPr lang="en-US" dirty="0"/>
+              <a:t> &lt;</a:t>
+            </a:r>
+            <a:r>
+              <a:rPr lang="en-US" dirty="0" err="1"/>
+              <a:t>KeyValuePair</a:t>
+            </a:r>
+            <a:r>
+              <a:rPr lang="en-US" dirty="0"/>
+              <a:t> &lt;</a:t>
+            </a:r>
+            <a:r>
+              <a:rPr lang="en-US" dirty="0" err="1"/>
+              <a:t>TKey</a:t>
+            </a:r>
+            <a:r>
+              <a:rPr lang="en-US" dirty="0"/>
+              <a:t>, </a:t>
+            </a:r>
+            <a:r>
+              <a:rPr lang="en-US" dirty="0" err="1"/>
+              <a:t>TValue</a:t>
+            </a:r>
+            <a:r>
+              <a:rPr lang="en-US" dirty="0"/>
+              <a:t>&gt;&gt;, </a:t>
+            </a:r>
+            <a:r>
+              <a:rPr lang="en-US" dirty="0" err="1"/>
+              <a:t>IEnumerable</a:t>
+            </a:r>
+            <a:endParaRPr lang="en-US" dirty="0"/>
+          </a:p>
+          <a:p>
+            <a:pPr marL="800100" lvl="2" indent="0">
+              <a:buNone/>
+            </a:pPr>
+            <a:r>
+              <a:rPr lang="en-US" dirty="0"/>
+              <a:t>{</a:t>
+            </a:r>
+          </a:p>
+          <a:p>
+            <a:pPr marL="1257300" lvl="3" indent="0">
+              <a:buNone/>
+            </a:pPr>
+            <a:r>
+              <a:rPr lang="en-US" dirty="0" err="1"/>
+              <a:t>bool</a:t>
+            </a:r>
+            <a:r>
+              <a:rPr lang="en-US" dirty="0"/>
+              <a:t> </a:t>
+            </a:r>
+            <a:r>
+              <a:rPr lang="en-US" dirty="0" err="1"/>
+              <a:t>ContainsKey</a:t>
+            </a:r>
+            <a:r>
+              <a:rPr lang="en-US" dirty="0"/>
+              <a:t> (</a:t>
+            </a:r>
+            <a:r>
+              <a:rPr lang="en-US" dirty="0" err="1"/>
+              <a:t>TKey</a:t>
+            </a:r>
+            <a:r>
+              <a:rPr lang="en-US" dirty="0"/>
+              <a:t> key);</a:t>
+            </a:r>
+          </a:p>
+          <a:p>
+            <a:pPr marL="1257300" lvl="3" indent="0">
+              <a:buNone/>
+            </a:pPr>
+            <a:r>
+              <a:rPr lang="en-US" dirty="0" err="1"/>
+              <a:t>bool</a:t>
+            </a:r>
+            <a:r>
+              <a:rPr lang="en-US" dirty="0"/>
+              <a:t> </a:t>
+            </a:r>
+            <a:r>
+              <a:rPr lang="en-US" dirty="0" err="1"/>
+              <a:t>TryGetValue</a:t>
+            </a:r>
+            <a:r>
+              <a:rPr lang="en-US" dirty="0"/>
+              <a:t> (</a:t>
+            </a:r>
+            <a:r>
+              <a:rPr lang="en-US" dirty="0" err="1"/>
+              <a:t>TKey</a:t>
+            </a:r>
+            <a:r>
+              <a:rPr lang="en-US" dirty="0"/>
+              <a:t> key, out </a:t>
+            </a:r>
+            <a:r>
+              <a:rPr lang="en-US" dirty="0" err="1"/>
+              <a:t>TValue</a:t>
+            </a:r>
+            <a:r>
+              <a:rPr lang="en-US" dirty="0"/>
+              <a:t> value);</a:t>
+            </a:r>
+          </a:p>
+          <a:p>
+            <a:pPr marL="1257300" lvl="3" indent="0">
+              <a:buNone/>
+            </a:pPr>
+            <a:r>
+              <a:rPr lang="en-US" dirty="0"/>
+              <a:t>void Add (</a:t>
+            </a:r>
+            <a:r>
+              <a:rPr lang="en-US" dirty="0" err="1"/>
+              <a:t>TKey</a:t>
+            </a:r>
+            <a:r>
+              <a:rPr lang="en-US" dirty="0"/>
+              <a:t> key, </a:t>
+            </a:r>
+            <a:r>
+              <a:rPr lang="en-US" dirty="0" err="1"/>
+              <a:t>TValue</a:t>
+            </a:r>
+            <a:r>
+              <a:rPr lang="en-US" dirty="0"/>
+              <a:t> value);</a:t>
+            </a:r>
+          </a:p>
+          <a:p>
+            <a:pPr marL="1257300" lvl="3" indent="0">
+              <a:buNone/>
+            </a:pPr>
+            <a:r>
+              <a:rPr lang="en-US" dirty="0" err="1"/>
+              <a:t>bool</a:t>
+            </a:r>
+            <a:r>
+              <a:rPr lang="en-US" dirty="0"/>
+              <a:t> Remove (</a:t>
+            </a:r>
+            <a:r>
+              <a:rPr lang="en-US" dirty="0" err="1"/>
+              <a:t>TKey</a:t>
+            </a:r>
+            <a:r>
+              <a:rPr lang="en-US" dirty="0"/>
+              <a:t> key);</a:t>
+            </a:r>
+          </a:p>
+          <a:p>
+            <a:pPr marL="1257300" lvl="3" indent="0">
+              <a:buNone/>
+            </a:pPr>
+            <a:r>
+              <a:rPr lang="en-US" dirty="0" err="1"/>
+              <a:t>TValue</a:t>
+            </a:r>
+            <a:r>
+              <a:rPr lang="en-US" dirty="0"/>
+              <a:t> this [</a:t>
+            </a:r>
+            <a:r>
+              <a:rPr lang="en-US" dirty="0" err="1"/>
+              <a:t>TKey</a:t>
+            </a:r>
+            <a:r>
+              <a:rPr lang="en-US" dirty="0"/>
+              <a:t> key] { get; set; } // Main indexer - by key</a:t>
+            </a:r>
+          </a:p>
+          <a:p>
+            <a:pPr marL="1257300" lvl="3" indent="0">
+              <a:buNone/>
+            </a:pPr>
+            <a:r>
+              <a:rPr lang="en-US" dirty="0" err="1"/>
+              <a:t>ICollection</a:t>
+            </a:r>
+            <a:r>
+              <a:rPr lang="en-US" dirty="0"/>
+              <a:t> &lt;</a:t>
+            </a:r>
+            <a:r>
+              <a:rPr lang="en-US" dirty="0" err="1"/>
+              <a:t>TKey</a:t>
+            </a:r>
+            <a:r>
+              <a:rPr lang="en-US" dirty="0"/>
+              <a:t>&gt; Keys { get; } // Returns just keys</a:t>
+            </a:r>
+          </a:p>
+          <a:p>
+            <a:pPr marL="1257300" lvl="3" indent="0">
+              <a:buNone/>
+            </a:pPr>
+            <a:r>
+              <a:rPr lang="en-US" dirty="0" err="1"/>
+              <a:t>ICollection</a:t>
+            </a:r>
+            <a:r>
+              <a:rPr lang="en-US" dirty="0"/>
+              <a:t> &lt;</a:t>
+            </a:r>
+            <a:r>
+              <a:rPr lang="en-US" dirty="0" err="1"/>
+              <a:t>TValue</a:t>
+            </a:r>
+            <a:r>
+              <a:rPr lang="en-US" dirty="0"/>
+              <a:t>&gt; Values { get; } // Returns just values</a:t>
+            </a:r>
+          </a:p>
+          <a:p>
+            <a:pPr marL="800100" lvl="2" indent="0">
+              <a:buNone/>
+            </a:pPr>
+            <a:r>
+              <a:rPr lang="en-US" dirty="0"/>
+              <a:t>}</a:t>
+            </a:r>
+          </a:p>
+        </p:txBody>
+      </p:sp>
+    </p:spTree>
+    <p:extLst>
+      <p:ext uri="{BB962C8B-B14F-4D97-AF65-F5344CB8AC3E}">
+        <p14:creationId xmlns:p14="http://schemas.microsoft.com/office/powerpoint/2010/main" val="3030694944"/>
+      </p:ext>
+    </p:extLst>
+  </p:cSld>
+  <p:clrMapOvr>
+    <a:masterClrMapping/>
+  </p:clrMapOvr>
+  <p:timing>
+    <p:tnLst>
+      <p:par>
+        <p:cTn xmlns:p14="http://schemas.microsoft.com/office/powerpoint/2010/main" id="1" dur="indefinite" restart="never" nodeType="tmRoot"/>
+      </p:par>
+    </p:tnLst>
+  </p:timing>
+</p:sld>
+</file>
+
+<file path=ppt/slides/slide23.xml><?xml version="1.0" encoding="utf-8"?>
+<p:sld xmlns:a="http://schemas.openxmlformats.org/drawingml/2006/main" xmlns:r="http://schemas.openxmlformats.org/officeDocument/2006/relationships" xmlns:p="http://schemas.openxmlformats.org/presentationml/2006/main">
+  <p:cSld>
+    <p:spTree>
+      <p:nvGrpSpPr>
+        <p:cNvPr id="1" name=""/>
+        <p:cNvGrpSpPr/>
+        <p:nvPr/>
+      </p:nvGrpSpPr>
+      <p:grpSpPr>
+        <a:xfrm>
+          <a:off x="0" y="0"/>
+          <a:ext cx="0" cy="0"/>
+          <a:chOff x="0" y="0"/>
+          <a:chExt cx="0" cy="0"/>
+        </a:xfrm>
+      </p:grpSpPr>
+      <p:sp>
+        <p:nvSpPr>
+          <p:cNvPr id="3" name="Content Placeholder 2"/>
+          <p:cNvSpPr>
+            <a:spLocks noGrp="1"/>
+          </p:cNvSpPr>
+          <p:nvPr>
+            <p:ph idx="1"/>
+          </p:nvPr>
+        </p:nvSpPr>
+        <p:spPr>
+          <a:xfrm>
+            <a:off x="457200" y="403586"/>
+            <a:ext cx="8229600" cy="5722577"/>
+          </a:xfrm>
+        </p:spPr>
+        <p:txBody>
+          <a:bodyPr>
+            <a:normAutofit/>
+          </a:bodyPr>
+          <a:lstStyle/>
+          <a:p>
+            <a:r>
+              <a:rPr lang="en-US" dirty="0"/>
+              <a:t>Enumerating directly over an </a:t>
+            </a:r>
+            <a:r>
+              <a:rPr lang="en-US" dirty="0" err="1"/>
+              <a:t>IDictionary</a:t>
+            </a:r>
+            <a:r>
+              <a:rPr lang="en-US" dirty="0"/>
+              <a:t>&lt;</a:t>
+            </a:r>
+            <a:r>
+              <a:rPr lang="en-US" dirty="0" err="1"/>
+              <a:t>TKey,TValue</a:t>
+            </a:r>
+            <a:r>
+              <a:rPr lang="en-US" dirty="0"/>
+              <a:t>&gt; returns a sequence of Key</a:t>
+            </a:r>
+          </a:p>
+          <a:p>
+            <a:pPr lvl="1"/>
+            <a:r>
+              <a:rPr lang="en-US" dirty="0" err="1"/>
+              <a:t>ValuePair</a:t>
+            </a:r>
+            <a:r>
+              <a:rPr lang="en-US" dirty="0"/>
+              <a:t> </a:t>
+            </a:r>
+            <a:r>
+              <a:rPr lang="en-US" dirty="0" err="1"/>
+              <a:t>structs</a:t>
+            </a:r>
+            <a:r>
+              <a:rPr lang="en-US" dirty="0"/>
+              <a:t>:</a:t>
+            </a:r>
+          </a:p>
+          <a:p>
+            <a:pPr marL="1257300" lvl="3" indent="0">
+              <a:buNone/>
+            </a:pPr>
+            <a:r>
+              <a:rPr lang="en-US" dirty="0"/>
+              <a:t>public </a:t>
+            </a:r>
+            <a:r>
+              <a:rPr lang="en-US" dirty="0" err="1"/>
+              <a:t>struct</a:t>
+            </a:r>
+            <a:r>
+              <a:rPr lang="en-US" dirty="0"/>
+              <a:t> </a:t>
+            </a:r>
+            <a:r>
+              <a:rPr lang="en-US" dirty="0" err="1"/>
+              <a:t>KeyValuePair</a:t>
+            </a:r>
+            <a:r>
+              <a:rPr lang="en-US" dirty="0"/>
+              <a:t> &lt;</a:t>
+            </a:r>
+            <a:r>
+              <a:rPr lang="en-US" dirty="0" err="1"/>
+              <a:t>TKey</a:t>
+            </a:r>
+            <a:r>
+              <a:rPr lang="en-US" dirty="0"/>
+              <a:t>, </a:t>
+            </a:r>
+            <a:r>
+              <a:rPr lang="en-US" dirty="0" err="1"/>
+              <a:t>TValue</a:t>
+            </a:r>
+            <a:r>
+              <a:rPr lang="en-US" dirty="0"/>
+              <a:t>&gt;</a:t>
+            </a:r>
+          </a:p>
+          <a:p>
+            <a:pPr marL="1257300" lvl="3" indent="0">
+              <a:buNone/>
+            </a:pPr>
+            <a:r>
+              <a:rPr lang="en-US" dirty="0"/>
+              <a:t>{</a:t>
+            </a:r>
+          </a:p>
+          <a:p>
+            <a:pPr marL="1714500" lvl="4" indent="0">
+              <a:buNone/>
+            </a:pPr>
+            <a:r>
+              <a:rPr lang="en-US" dirty="0"/>
+              <a:t>public </a:t>
+            </a:r>
+            <a:r>
+              <a:rPr lang="en-US" dirty="0" err="1"/>
+              <a:t>TKey</a:t>
+            </a:r>
+            <a:r>
+              <a:rPr lang="en-US" dirty="0"/>
+              <a:t> Key { get; }</a:t>
+            </a:r>
+          </a:p>
+          <a:p>
+            <a:pPr marL="1714500" lvl="4" indent="0">
+              <a:buNone/>
+            </a:pPr>
+            <a:r>
+              <a:rPr lang="en-US" dirty="0"/>
+              <a:t>public </a:t>
+            </a:r>
+            <a:r>
+              <a:rPr lang="en-US" dirty="0" err="1"/>
+              <a:t>TValue</a:t>
+            </a:r>
+            <a:r>
+              <a:rPr lang="en-US" dirty="0"/>
+              <a:t> Value { get; }</a:t>
+            </a:r>
+          </a:p>
+          <a:p>
+            <a:pPr marL="1257300" lvl="3" indent="0">
+              <a:buNone/>
+            </a:pPr>
+            <a:r>
+              <a:rPr lang="en-US" dirty="0"/>
+              <a:t>}</a:t>
+            </a:r>
+          </a:p>
+        </p:txBody>
+      </p:sp>
+    </p:spTree>
+    <p:extLst>
+      <p:ext uri="{BB962C8B-B14F-4D97-AF65-F5344CB8AC3E}">
+        <p14:creationId xmlns:p14="http://schemas.microsoft.com/office/powerpoint/2010/main" val="3622396057"/>
+      </p:ext>
+    </p:extLst>
+  </p:cSld>
+  <p:clrMapOvr>
+    <a:masterClrMapping/>
+  </p:clrMapOvr>
+  <p:timing>
+    <p:tnLst>
+      <p:par>
+        <p:cTn xmlns:p14="http://schemas.microsoft.com/office/powerpoint/2010/main" id="1" dur="indefinite" restart="never" nodeType="tmRoot"/>
+      </p:par>
+    </p:tnLst>
+  </p:timing>
+</p:sld>
+</file>
+
+<file path=ppt/slides/slide24.xml><?xml version="1.0" encoding="utf-8"?>
+<p:sld xmlns:a="http://schemas.openxmlformats.org/drawingml/2006/main" xmlns:r="http://schemas.openxmlformats.org/officeDocument/2006/relationships" xmlns:p="http://schemas.openxmlformats.org/presentationml/2006/main">
+  <p:cSld>
+    <p:spTree>
+      <p:nvGrpSpPr>
+        <p:cNvPr id="1" name=""/>
+        <p:cNvGrpSpPr/>
+        <p:nvPr/>
+      </p:nvGrpSpPr>
+      <p:grpSpPr>
+        <a:xfrm>
+          <a:off x="0" y="0"/>
+          <a:ext cx="0" cy="0"/>
+          <a:chOff x="0" y="0"/>
+          <a:chExt cx="0" cy="0"/>
+        </a:xfrm>
+      </p:grpSpPr>
+      <p:sp>
+        <p:nvSpPr>
+          <p:cNvPr id="3" name="Content Placeholder 2"/>
+          <p:cNvSpPr>
+            <a:spLocks noGrp="1"/>
+          </p:cNvSpPr>
+          <p:nvPr>
+            <p:ph idx="1"/>
+          </p:nvPr>
+        </p:nvSpPr>
+        <p:spPr>
+          <a:xfrm>
+            <a:off x="457200" y="486678"/>
+            <a:ext cx="8229600" cy="5639485"/>
+          </a:xfrm>
+        </p:spPr>
+        <p:txBody>
+          <a:bodyPr>
+            <a:normAutofit/>
+          </a:bodyPr>
+          <a:lstStyle/>
+          <a:p>
+            <a:r>
+              <a:rPr lang="en-US" dirty="0" err="1" smtClean="0"/>
+              <a:t>IDictionary</a:t>
+            </a:r>
+            <a:endParaRPr lang="en-US" dirty="0" smtClean="0"/>
+          </a:p>
+          <a:p>
+            <a:pPr lvl="1"/>
+            <a:r>
+              <a:rPr lang="en-US" dirty="0"/>
+              <a:t>The </a:t>
+            </a:r>
+            <a:r>
+              <a:rPr lang="en-US" dirty="0" err="1"/>
+              <a:t>nongeneric</a:t>
+            </a:r>
+            <a:r>
+              <a:rPr lang="en-US" dirty="0"/>
+              <a:t> </a:t>
+            </a:r>
+            <a:r>
+              <a:rPr lang="en-US" sz="2400" dirty="0" err="1"/>
+              <a:t>IDictionary</a:t>
+            </a:r>
+            <a:r>
+              <a:rPr lang="en-US" sz="2400" dirty="0"/>
+              <a:t> </a:t>
+            </a:r>
+            <a:r>
+              <a:rPr lang="en-US" dirty="0"/>
+              <a:t>interface is the same in principle </a:t>
+            </a:r>
+            <a:r>
+              <a:rPr lang="en-US" dirty="0" smtClean="0"/>
+              <a:t>as </a:t>
+            </a:r>
+            <a:r>
+              <a:rPr lang="en-US" dirty="0" err="1" smtClean="0"/>
+              <a:t>IDictionary</a:t>
+            </a:r>
+            <a:r>
+              <a:rPr lang="en-US" dirty="0" smtClean="0"/>
+              <a:t>&lt;</a:t>
+            </a:r>
+            <a:r>
+              <a:rPr lang="en-US" dirty="0" err="1" smtClean="0"/>
+              <a:t>TKey,TValue</a:t>
+            </a:r>
+            <a:r>
+              <a:rPr lang="en-US" dirty="0" smtClean="0"/>
+              <a:t>&gt;</a:t>
+            </a:r>
+          </a:p>
+          <a:p>
+            <a:pPr lvl="1"/>
+            <a:endParaRPr lang="en-US" dirty="0"/>
+          </a:p>
+          <a:p>
+            <a:pPr lvl="1"/>
+            <a:r>
+              <a:rPr lang="en-US" dirty="0"/>
+              <a:t>Enumerating over a </a:t>
+            </a:r>
+            <a:r>
+              <a:rPr lang="en-US" dirty="0" err="1"/>
+              <a:t>nongeneric</a:t>
+            </a:r>
+            <a:r>
+              <a:rPr lang="en-US" dirty="0"/>
+              <a:t> </a:t>
+            </a:r>
+            <a:r>
+              <a:rPr lang="en-US" sz="2400" dirty="0" err="1"/>
+              <a:t>IDictionary</a:t>
+            </a:r>
+            <a:r>
+              <a:rPr lang="en-US" sz="2400" dirty="0"/>
+              <a:t> </a:t>
+            </a:r>
+            <a:r>
+              <a:rPr lang="en-US" dirty="0"/>
+              <a:t>returns a sequence of </a:t>
+            </a:r>
+            <a:r>
+              <a:rPr lang="en-US" sz="2400" dirty="0" err="1" smtClean="0"/>
+              <a:t>DictionaryEntry</a:t>
+            </a:r>
+            <a:r>
+              <a:rPr lang="en-US" sz="2400" dirty="0" smtClean="0"/>
+              <a:t> </a:t>
+            </a:r>
+          </a:p>
+          <a:p>
+            <a:pPr lvl="2"/>
+            <a:r>
+              <a:rPr lang="en-US" dirty="0" err="1" smtClean="0"/>
+              <a:t>structs</a:t>
+            </a:r>
+            <a:r>
+              <a:rPr lang="en-US" dirty="0"/>
+              <a:t>:</a:t>
+            </a:r>
+          </a:p>
+          <a:p>
+            <a:pPr marL="1257300" lvl="3" indent="0">
+              <a:buNone/>
+            </a:pPr>
+            <a:r>
+              <a:rPr lang="en-US" dirty="0"/>
+              <a:t>public </a:t>
+            </a:r>
+            <a:r>
+              <a:rPr lang="en-US" dirty="0" err="1"/>
+              <a:t>struct</a:t>
+            </a:r>
+            <a:r>
+              <a:rPr lang="en-US" dirty="0"/>
+              <a:t> </a:t>
+            </a:r>
+            <a:r>
+              <a:rPr lang="en-US" dirty="0" err="1"/>
+              <a:t>DictionaryEntry</a:t>
+            </a:r>
+            <a:endParaRPr lang="en-US" dirty="0"/>
+          </a:p>
+          <a:p>
+            <a:pPr marL="1257300" lvl="3" indent="0">
+              <a:buNone/>
+            </a:pPr>
+            <a:r>
+              <a:rPr lang="en-US" dirty="0"/>
+              <a:t>{</a:t>
+            </a:r>
+          </a:p>
+          <a:p>
+            <a:pPr marL="1257300" lvl="3" indent="0">
+              <a:buNone/>
+            </a:pPr>
+            <a:r>
+              <a:rPr lang="en-US" dirty="0"/>
+              <a:t>public object Key { get; set; }</a:t>
+            </a:r>
+          </a:p>
+          <a:p>
+            <a:pPr marL="1257300" lvl="3" indent="0">
+              <a:buNone/>
+            </a:pPr>
+            <a:r>
+              <a:rPr lang="en-US" dirty="0"/>
+              <a:t>public object Value { get; set; }</a:t>
+            </a:r>
+          </a:p>
+          <a:p>
+            <a:pPr marL="1257300" lvl="3" indent="0">
+              <a:buNone/>
+            </a:pPr>
+            <a:r>
+              <a:rPr lang="en-US" dirty="0"/>
+              <a:t>}</a:t>
+            </a:r>
+          </a:p>
+        </p:txBody>
+      </p:sp>
+    </p:spTree>
+    <p:extLst>
+      <p:ext uri="{BB962C8B-B14F-4D97-AF65-F5344CB8AC3E}">
+        <p14:creationId xmlns:p14="http://schemas.microsoft.com/office/powerpoint/2010/main" val="1175080686"/>
+      </p:ext>
+    </p:extLst>
+  </p:cSld>
+  <p:clrMapOvr>
+    <a:masterClrMapping/>
+  </p:clrMapOvr>
+  <p:timing>
+    <p:tnLst>
+      <p:par>
+        <p:cTn xmlns:p14="http://schemas.microsoft.com/office/powerpoint/2010/main" id="1" dur="indefinite" restart="never" nodeType="tmRoot"/>
+      </p:par>
+    </p:tnLst>
+  </p:timing>
+</p:sld>
+</file>
+
+<file path=ppt/slides/slide25.xml><?xml version="1.0" encoding="utf-8"?>
+<p:sld xmlns:a="http://schemas.openxmlformats.org/drawingml/2006/main" xmlns:r="http://schemas.openxmlformats.org/officeDocument/2006/relationships" xmlns:p="http://schemas.openxmlformats.org/presentationml/2006/main">
+  <p:cSld>
+    <p:spTree>
+      <p:nvGrpSpPr>
+        <p:cNvPr id="1" name=""/>
+        <p:cNvGrpSpPr/>
+        <p:nvPr/>
+      </p:nvGrpSpPr>
+      <p:grpSpPr>
+        <a:xfrm>
+          <a:off x="0" y="0"/>
+          <a:ext cx="0" cy="0"/>
+          <a:chOff x="0" y="0"/>
+          <a:chExt cx="0" cy="0"/>
+        </a:xfrm>
+      </p:grpSpPr>
+      <p:sp>
+        <p:nvSpPr>
+          <p:cNvPr id="2" name="Title 1"/>
+          <p:cNvSpPr>
+            <a:spLocks noGrp="1"/>
+          </p:cNvSpPr>
+          <p:nvPr>
+            <p:ph type="title"/>
+          </p:nvPr>
+        </p:nvSpPr>
+        <p:spPr/>
+        <p:txBody>
+          <a:bodyPr/>
+          <a:lstStyle/>
+          <a:p>
+            <a:r>
+              <a:rPr lang="en-US" dirty="0" err="1"/>
+              <a:t>IEqualityComparer</a:t>
+            </a:r>
+            <a:endParaRPr lang="en-US" dirty="0"/>
+          </a:p>
+        </p:txBody>
+      </p:sp>
+      <p:sp>
+        <p:nvSpPr>
+          <p:cNvPr id="3" name="Content Placeholder 2"/>
+          <p:cNvSpPr>
+            <a:spLocks noGrp="1"/>
+          </p:cNvSpPr>
+          <p:nvPr>
+            <p:ph idx="1"/>
+          </p:nvPr>
+        </p:nvSpPr>
+        <p:spPr/>
+        <p:txBody>
+          <a:bodyPr>
+            <a:normAutofit fontScale="85000" lnSpcReduction="10000"/>
+          </a:bodyPr>
+          <a:lstStyle/>
+          <a:p>
+            <a:pPr marL="0" indent="0">
+              <a:buNone/>
+            </a:pPr>
+            <a:r>
+              <a:rPr lang="en-US" dirty="0"/>
+              <a:t>public interface </a:t>
+            </a:r>
+            <a:r>
+              <a:rPr lang="en-US" dirty="0" err="1"/>
+              <a:t>IEqualityComparer</a:t>
+            </a:r>
+            <a:r>
+              <a:rPr lang="en-US" dirty="0"/>
+              <a:t>&lt;T&gt;</a:t>
+            </a:r>
+          </a:p>
+          <a:p>
+            <a:pPr marL="0" indent="0">
+              <a:buNone/>
+            </a:pPr>
+            <a:r>
+              <a:rPr lang="en-US" dirty="0"/>
+              <a:t>{</a:t>
+            </a:r>
+          </a:p>
+          <a:p>
+            <a:pPr marL="400050" lvl="1" indent="0">
+              <a:buNone/>
+            </a:pPr>
+            <a:r>
+              <a:rPr lang="en-US" dirty="0" err="1"/>
+              <a:t>bool</a:t>
+            </a:r>
+            <a:r>
+              <a:rPr lang="en-US" dirty="0"/>
+              <a:t> Equals (T x, T y);</a:t>
+            </a:r>
+          </a:p>
+          <a:p>
+            <a:pPr marL="400050" lvl="1" indent="0">
+              <a:buNone/>
+            </a:pPr>
+            <a:r>
+              <a:rPr lang="en-US" dirty="0" err="1"/>
+              <a:t>int</a:t>
+            </a:r>
+            <a:r>
+              <a:rPr lang="en-US" dirty="0"/>
+              <a:t> </a:t>
+            </a:r>
+            <a:r>
+              <a:rPr lang="en-US" dirty="0" err="1"/>
+              <a:t>GetHashCode</a:t>
+            </a:r>
+            <a:r>
+              <a:rPr lang="en-US" dirty="0"/>
+              <a:t> (T </a:t>
+            </a:r>
+            <a:r>
+              <a:rPr lang="en-US" dirty="0" err="1"/>
+              <a:t>obj</a:t>
+            </a:r>
+            <a:r>
+              <a:rPr lang="en-US" dirty="0"/>
+              <a:t>);</a:t>
+            </a:r>
+          </a:p>
+          <a:p>
+            <a:pPr marL="0" indent="0">
+              <a:buNone/>
+            </a:pPr>
+            <a:r>
+              <a:rPr lang="en-US" dirty="0"/>
+              <a:t>}</a:t>
+            </a:r>
+          </a:p>
+          <a:p>
+            <a:pPr marL="0" indent="0">
+              <a:buNone/>
+            </a:pPr>
+            <a:r>
+              <a:rPr lang="en-US" dirty="0"/>
+              <a:t>public interface </a:t>
+            </a:r>
+            <a:r>
+              <a:rPr lang="en-US" dirty="0" err="1"/>
+              <a:t>IEqualityComparer</a:t>
+            </a:r>
+            <a:r>
+              <a:rPr lang="en-US" dirty="0"/>
+              <a:t> // </a:t>
+            </a:r>
+            <a:r>
+              <a:rPr lang="en-US" dirty="0" err="1"/>
+              <a:t>Nongeneric</a:t>
+            </a:r>
+            <a:r>
+              <a:rPr lang="en-US" dirty="0"/>
+              <a:t> version</a:t>
+            </a:r>
+          </a:p>
+          <a:p>
+            <a:pPr marL="0" indent="0">
+              <a:buNone/>
+            </a:pPr>
+            <a:r>
+              <a:rPr lang="en-US" dirty="0"/>
+              <a:t>{</a:t>
+            </a:r>
+          </a:p>
+          <a:p>
+            <a:pPr marL="400050" lvl="1" indent="0">
+              <a:buNone/>
+            </a:pPr>
+            <a:r>
+              <a:rPr lang="en-US" dirty="0" err="1"/>
+              <a:t>bool</a:t>
+            </a:r>
+            <a:r>
+              <a:rPr lang="en-US" dirty="0"/>
+              <a:t> Equals (object x, object y);</a:t>
+            </a:r>
+          </a:p>
+          <a:p>
+            <a:pPr marL="400050" lvl="1" indent="0">
+              <a:buNone/>
+            </a:pPr>
+            <a:r>
+              <a:rPr lang="en-US" dirty="0" err="1"/>
+              <a:t>int</a:t>
+            </a:r>
+            <a:r>
+              <a:rPr lang="en-US" dirty="0"/>
+              <a:t> </a:t>
+            </a:r>
+            <a:r>
+              <a:rPr lang="en-US" dirty="0" err="1"/>
+              <a:t>GetHashCode</a:t>
+            </a:r>
+            <a:r>
+              <a:rPr lang="en-US" dirty="0"/>
+              <a:t> (object </a:t>
+            </a:r>
+            <a:r>
+              <a:rPr lang="en-US" dirty="0" err="1"/>
+              <a:t>obj</a:t>
+            </a:r>
+            <a:r>
+              <a:rPr lang="en-US" dirty="0"/>
+              <a:t>);</a:t>
+            </a:r>
+          </a:p>
+          <a:p>
+            <a:pPr marL="0" indent="0">
+              <a:buNone/>
+            </a:pPr>
+            <a:r>
+              <a:rPr lang="en-US" dirty="0"/>
+              <a:t>}</a:t>
+            </a:r>
+          </a:p>
+        </p:txBody>
+      </p:sp>
+    </p:spTree>
+    <p:extLst>
+      <p:ext uri="{BB962C8B-B14F-4D97-AF65-F5344CB8AC3E}">
+        <p14:creationId xmlns:p14="http://schemas.microsoft.com/office/powerpoint/2010/main" val="702345847"/>
+      </p:ext>
+    </p:extLst>
+  </p:cSld>
+  <p:clrMapOvr>
+    <a:masterClrMapping/>
+  </p:clrMapOvr>
+  <p:timing>
+    <p:tnLst>
+      <p:par>
+        <p:cTn xmlns:p14="http://schemas.microsoft.com/office/powerpoint/2010/main" id="1" dur="indefinite" restart="never" nodeType="tmRoot"/>
+      </p:par>
+    </p:tnLst>
+  </p:timing>
+</p:sld>
+</file>
+
+<file path=ppt/slides/slide26.xml><?xml version="1.0" encoding="utf-8"?>
+<p:sld xmlns:a="http://schemas.openxmlformats.org/drawingml/2006/main" xmlns:r="http://schemas.openxmlformats.org/officeDocument/2006/relationships" xmlns:p="http://schemas.openxmlformats.org/presentationml/2006/main">
+  <p:cSld>
+    <p:spTree>
+      <p:nvGrpSpPr>
+        <p:cNvPr id="1" name=""/>
+        <p:cNvGrpSpPr/>
+        <p:nvPr/>
+      </p:nvGrpSpPr>
+      <p:grpSpPr>
+        <a:xfrm>
+          <a:off x="0" y="0"/>
+          <a:ext cx="0" cy="0"/>
+          <a:chOff x="0" y="0"/>
+          <a:chExt cx="0" cy="0"/>
+        </a:xfrm>
+      </p:grpSpPr>
+      <p:sp>
+        <p:nvSpPr>
+          <p:cNvPr id="2" name="Title 1"/>
+          <p:cNvSpPr>
+            <a:spLocks noGrp="1"/>
+          </p:cNvSpPr>
+          <p:nvPr>
+            <p:ph type="title"/>
+          </p:nvPr>
+        </p:nvSpPr>
+        <p:spPr/>
+        <p:txBody>
+          <a:bodyPr/>
+          <a:lstStyle/>
+          <a:p>
+            <a:r>
+              <a:rPr lang="en-US" dirty="0"/>
+              <a:t>IComparer and Comparer</a:t>
+            </a:r>
+          </a:p>
+        </p:txBody>
+      </p:sp>
+      <p:sp>
+        <p:nvSpPr>
+          <p:cNvPr id="3" name="Content Placeholder 2"/>
+          <p:cNvSpPr>
+            <a:spLocks noGrp="1"/>
+          </p:cNvSpPr>
+          <p:nvPr>
+            <p:ph idx="1"/>
+          </p:nvPr>
+        </p:nvSpPr>
+        <p:spPr/>
+        <p:txBody>
+          <a:bodyPr>
+            <a:normAutofit lnSpcReduction="10000"/>
+          </a:bodyPr>
+          <a:lstStyle/>
+          <a:p>
+            <a:pPr marL="0" indent="0">
+              <a:buNone/>
+            </a:pPr>
+            <a:r>
+              <a:rPr lang="en-US" dirty="0"/>
+              <a:t>public interface IComparer</a:t>
+            </a:r>
+          </a:p>
+          <a:p>
+            <a:pPr marL="0" indent="0">
+              <a:buNone/>
+            </a:pPr>
+            <a:r>
+              <a:rPr lang="en-US" dirty="0"/>
+              <a:t>{</a:t>
+            </a:r>
+          </a:p>
+          <a:p>
+            <a:pPr marL="400050" lvl="1" indent="0">
+              <a:buNone/>
+            </a:pPr>
+            <a:r>
+              <a:rPr lang="en-US" dirty="0" err="1"/>
+              <a:t>int</a:t>
+            </a:r>
+            <a:r>
+              <a:rPr lang="en-US" dirty="0"/>
+              <a:t> Compare(object x, object y)</a:t>
+            </a:r>
+            <a:r>
+              <a:rPr lang="en-US" dirty="0" smtClean="0"/>
+              <a:t>; //</a:t>
+            </a:r>
+            <a:endParaRPr lang="en-US" dirty="0"/>
+          </a:p>
+          <a:p>
+            <a:pPr marL="0" indent="0">
+              <a:buNone/>
+            </a:pPr>
+            <a:r>
+              <a:rPr lang="en-US" dirty="0"/>
+              <a:t>}</a:t>
+            </a:r>
+          </a:p>
+          <a:p>
+            <a:pPr marL="0" indent="0">
+              <a:buNone/>
+            </a:pPr>
+            <a:r>
+              <a:rPr lang="en-US" dirty="0"/>
+              <a:t>public interface IComparer &lt;in T&gt;</a:t>
+            </a:r>
+          </a:p>
+          <a:p>
+            <a:pPr marL="0" indent="0">
+              <a:buNone/>
+            </a:pPr>
+            <a:r>
+              <a:rPr lang="en-US" dirty="0"/>
+              <a:t>{</a:t>
+            </a:r>
+          </a:p>
+          <a:p>
+            <a:pPr marL="400050" lvl="1" indent="0">
+              <a:buNone/>
+            </a:pPr>
+            <a:r>
+              <a:rPr lang="en-US" dirty="0" err="1"/>
+              <a:t>int</a:t>
+            </a:r>
+            <a:r>
+              <a:rPr lang="en-US" dirty="0"/>
+              <a:t> Compare(T x, T y)</a:t>
+            </a:r>
+            <a:r>
+              <a:rPr lang="en-US" dirty="0" smtClean="0"/>
+              <a:t>;   </a:t>
+            </a:r>
+            <a:endParaRPr lang="en-US" dirty="0"/>
+          </a:p>
+          <a:p>
+            <a:pPr marL="0" indent="0">
+              <a:buNone/>
+            </a:pPr>
+            <a:r>
+              <a:rPr lang="en-US" dirty="0"/>
+              <a:t>}</a:t>
+            </a:r>
+          </a:p>
+        </p:txBody>
+      </p:sp>
+      <p:sp>
+        <p:nvSpPr>
+          <p:cNvPr id="4" name="Rectangle 3"/>
+          <p:cNvSpPr/>
+          <p:nvPr/>
+        </p:nvSpPr>
+        <p:spPr>
+          <a:xfrm>
+            <a:off x="6088575" y="4688612"/>
+            <a:ext cx="2938796" cy="646331"/>
+          </a:xfrm>
+          <a:prstGeom prst="rect">
+            <a:avLst/>
+          </a:prstGeom>
+        </p:spPr>
+        <p:txBody>
+          <a:bodyPr wrap="square">
+            <a:spAutoFit/>
+          </a:bodyPr>
+          <a:lstStyle/>
+          <a:p>
+            <a:r>
+              <a:rPr lang="en-US" sz="1200" dirty="0" smtClean="0"/>
+              <a:t>Less than zero 	- x is less than y.</a:t>
+            </a:r>
+          </a:p>
+          <a:p>
+            <a:r>
+              <a:rPr lang="en-US" sz="1200" dirty="0" smtClean="0"/>
+              <a:t>Zero 			- x equals y.</a:t>
+            </a:r>
+          </a:p>
+          <a:p>
+            <a:r>
+              <a:rPr lang="en-US" sz="1200" dirty="0" smtClean="0"/>
+              <a:t>Greater than zero	- x is greater than y.</a:t>
+            </a:r>
+            <a:endParaRPr lang="en-US" sz="1200" dirty="0"/>
+          </a:p>
+        </p:txBody>
+      </p:sp>
+    </p:spTree>
+    <p:extLst>
+      <p:ext uri="{BB962C8B-B14F-4D97-AF65-F5344CB8AC3E}">
+        <p14:creationId xmlns:p14="http://schemas.microsoft.com/office/powerpoint/2010/main" val="3943045857"/>
+      </p:ext>
+    </p:extLst>
+  </p:cSld>
+  <p:clrMapOvr>
+    <a:masterClrMapping/>
+  </p:clrMapOvr>
+  <p:timing>
+    <p:tnLst>
+      <p:par>
+        <p:cTn xmlns:p14="http://schemas.microsoft.com/office/powerpoint/2010/main" id="1" dur="indefinite" restart="never" nodeType="tmRoot"/>
+      </p:par>
+    </p:tnLst>
+  </p:timing>
+</p:sld>
+</file>
+
+<file path=ppt/slides/slide27.xml><?xml version="1.0" encoding="utf-8"?>
+<p:sld xmlns:a="http://schemas.openxmlformats.org/drawingml/2006/main" xmlns:r="http://schemas.openxmlformats.org/officeDocument/2006/relationships" xmlns:p="http://schemas.openxmlformats.org/presentationml/2006/main">
+  <p:cSld>
+    <p:spTree>
+      <p:nvGrpSpPr>
+        <p:cNvPr id="1" name=""/>
+        <p:cNvGrpSpPr/>
+        <p:nvPr/>
+      </p:nvGrpSpPr>
+      <p:grpSpPr>
+        <a:xfrm>
+          <a:off x="0" y="0"/>
+          <a:ext cx="0" cy="0"/>
+          <a:chOff x="0" y="0"/>
+          <a:chExt cx="0" cy="0"/>
+        </a:xfrm>
+      </p:grpSpPr>
+      <p:sp>
+        <p:nvSpPr>
+          <p:cNvPr id="2" name="Title 1"/>
+          <p:cNvSpPr>
+            <a:spLocks noGrp="1"/>
+          </p:cNvSpPr>
+          <p:nvPr>
+            <p:ph type="title"/>
+          </p:nvPr>
+        </p:nvSpPr>
+        <p:spPr>
+          <a:xfrm>
+            <a:off x="457200" y="3420237"/>
+            <a:ext cx="8229600" cy="1143000"/>
+          </a:xfrm>
+        </p:spPr>
+        <p:txBody>
+          <a:bodyPr/>
+          <a:lstStyle/>
+          <a:p>
+            <a:r>
+              <a:rPr lang="en-US" dirty="0" smtClean="0"/>
+              <a:t>Thank you</a:t>
+            </a:r>
+            <a:endParaRPr lang="en-US" dirty="0"/>
+          </a:p>
+        </p:txBody>
+      </p:sp>
+    </p:spTree>
+    <p:extLst>
+      <p:ext uri="{BB962C8B-B14F-4D97-AF65-F5344CB8AC3E}">
+        <p14:creationId xmlns:p14="http://schemas.microsoft.com/office/powerpoint/2010/main" val="1929483823"/>
+      </p:ext>
+    </p:extLst>
+  </p:cSld>
+  <p:clrMapOvr>
+    <a:masterClrMapping/>
+  </p:clrMapOvr>
+  <p:timing>
+    <p:tnLst>
+      <p:par>
+        <p:cTn xmlns:p14="http://schemas.microsoft.com/office/powerpoint/2010/main" id="1" dur="indefinite" restart="never" nodeType="tmRoot"/>
+      </p:par>
+    </p:tnLst>
+  </p:timing>
 </p:sld>
 </file>
 

</xml_diff>